<commit_message>
Added more to the storyboard
</commit_message>
<xml_diff>
--- a/Storyboard Design.pptx
+++ b/Storyboard Design.pptx
@@ -10,9 +10,9 @@
   <p:sldIdLst>
     <p:sldId id="261" r:id="rId2"/>
     <p:sldId id="265" r:id="rId3"/>
-    <p:sldId id="256" r:id="rId4"/>
-    <p:sldId id="257" r:id="rId5"/>
-    <p:sldId id="258" r:id="rId6"/>
+    <p:sldId id="266" r:id="rId4"/>
+    <p:sldId id="267" r:id="rId5"/>
+    <p:sldId id="268" r:id="rId6"/>
     <p:sldId id="259" r:id="rId7"/>
     <p:sldId id="260" r:id="rId8"/>
     <p:sldId id="263" r:id="rId9"/>
@@ -603,7 +603,7 @@
           <a:p>
             <a:r>
               <a:rPr lang="en-US" dirty="0" smtClean="0"/>
-              <a:t>Login</a:t>
+              <a:t>Need to check against existing usernames</a:t>
             </a:r>
             <a:endParaRPr lang="en-US" dirty="0"/>
           </a:p>
@@ -635,7 +635,7 @@
     </p:spTree>
     <p:extLst>
       <p:ext uri="{BB962C8B-B14F-4D97-AF65-F5344CB8AC3E}">
-        <p14:creationId xmlns:p14="http://schemas.microsoft.com/office/powerpoint/2010/main" val="626358615"/>
+        <p14:creationId xmlns:p14="http://schemas.microsoft.com/office/powerpoint/2010/main" val="1012401531"/>
       </p:ext>
     </p:extLst>
   </p:cSld>
@@ -689,6 +689,39 @@
           <a:bodyPr/>
           <a:lstStyle/>
           <a:p>
+            <a:r>
+              <a:rPr lang="en-US" dirty="0" smtClean="0"/>
+              <a:t>Can throw</a:t>
+            </a:r>
+            <a:r>
+              <a:rPr lang="en-US" baseline="0" dirty="0" smtClean="0"/>
+              <a:t> an error under the text field if the user doesn’t exist</a:t>
+            </a:r>
+          </a:p>
+          <a:p>
+            <a:pPr marL="0" marR="0" indent="0" algn="l" defTabSz="914400" rtl="0" eaLnBrk="1" fontAlgn="auto" latinLnBrk="0" hangingPunct="1">
+              <a:lnSpc>
+                <a:spcPct val="100000"/>
+              </a:lnSpc>
+              <a:spcBef>
+                <a:spcPts val="0"/>
+              </a:spcBef>
+              <a:spcAft>
+                <a:spcPts val="0"/>
+              </a:spcAft>
+              <a:buClrTx/>
+              <a:buSzTx/>
+              <a:buFontTx/>
+              <a:buNone/>
+              <a:tabLst/>
+              <a:defRPr/>
+            </a:pPr>
+            <a:r>
+              <a:rPr lang="en-US" dirty="0" smtClean="0"/>
+              <a:t>Will parse automatically the texts inputted</a:t>
+            </a:r>
+          </a:p>
+          <a:p>
             <a:endParaRPr lang="en-US" dirty="0"/>
           </a:p>
         </p:txBody>
@@ -719,7 +752,7 @@
     </p:spTree>
     <p:extLst>
       <p:ext uri="{BB962C8B-B14F-4D97-AF65-F5344CB8AC3E}">
-        <p14:creationId xmlns:p14="http://schemas.microsoft.com/office/powerpoint/2010/main" val="394672740"/>
+        <p14:creationId xmlns:p14="http://schemas.microsoft.com/office/powerpoint/2010/main" val="1294844252"/>
       </p:ext>
     </p:extLst>
   </p:cSld>
@@ -775,12 +808,37 @@
           <a:p>
             <a:r>
               <a:rPr lang="en-US" dirty="0" smtClean="0"/>
-              <a:t>Will parse automatically the texts </a:t>
-            </a:r>
-            <a:r>
-              <a:rPr lang="en-US" dirty="0" err="1" smtClean="0"/>
-              <a:t>inputed</a:t>
-            </a:r>
+              <a:t>Can throw</a:t>
+            </a:r>
+            <a:r>
+              <a:rPr lang="en-US" baseline="0" dirty="0" smtClean="0"/>
+              <a:t> an error under the text field if the user doesn’t exist</a:t>
+            </a:r>
+          </a:p>
+          <a:p>
+            <a:pPr marL="0" marR="0" indent="0" algn="l" defTabSz="914400" rtl="0" eaLnBrk="1" fontAlgn="auto" latinLnBrk="0" hangingPunct="1">
+              <a:lnSpc>
+                <a:spcPct val="100000"/>
+              </a:lnSpc>
+              <a:spcBef>
+                <a:spcPts val="0"/>
+              </a:spcBef>
+              <a:spcAft>
+                <a:spcPts val="0"/>
+              </a:spcAft>
+              <a:buClrTx/>
+              <a:buSzTx/>
+              <a:buFontTx/>
+              <a:buNone/>
+              <a:tabLst/>
+              <a:defRPr/>
+            </a:pPr>
+            <a:r>
+              <a:rPr lang="en-US" dirty="0" smtClean="0"/>
+              <a:t>Will parse automatically the texts inputted</a:t>
+            </a:r>
+          </a:p>
+          <a:p>
             <a:endParaRPr lang="en-US" dirty="0"/>
           </a:p>
         </p:txBody>
@@ -811,7 +869,7 @@
     </p:spTree>
     <p:extLst>
       <p:ext uri="{BB962C8B-B14F-4D97-AF65-F5344CB8AC3E}">
-        <p14:creationId xmlns:p14="http://schemas.microsoft.com/office/powerpoint/2010/main" val="844848586"/>
+        <p14:creationId xmlns:p14="http://schemas.microsoft.com/office/powerpoint/2010/main" val="393491078"/>
       </p:ext>
     </p:extLst>
   </p:cSld>
@@ -4088,23 +4146,6 @@
           <a:lstStyle/>
           <a:p>
             <a:pPr algn="ctr"/>
-            <a:endParaRPr lang="en-US" smtClean="0">
-              <a:solidFill>
-                <a:schemeClr val="bg1">
-                  <a:lumMod val="75000"/>
-                </a:schemeClr>
-              </a:solidFill>
-              <a:effectLst>
-                <a:outerShdw blurRad="50800" dist="177800" dir="4080000" algn="ctr" rotWithShape="0">
-                  <a:srgbClr val="000000">
-                    <a:alpha val="43137"/>
-                  </a:srgbClr>
-                </a:outerShdw>
-              </a:effectLst>
-            </a:endParaRPr>
-          </a:p>
-          <a:p>
-            <a:pPr algn="ctr"/>
             <a:endParaRPr lang="en-US" dirty="0" smtClean="0">
               <a:solidFill>
                 <a:schemeClr val="bg1">
@@ -4258,35 +4299,75 @@
           </a:p>
           <a:p>
             <a:pPr algn="ctr"/>
-            <a:r>
-              <a:rPr lang="en-US" sz="2400" dirty="0" smtClean="0">
-                <a:solidFill>
-                  <a:schemeClr val="bg1">
-                    <a:lumMod val="75000"/>
-                  </a:schemeClr>
-                </a:solidFill>
-                <a:effectLst>
-                  <a:outerShdw blurRad="50800" dist="177800" dir="4080000" sx="105000" sy="105000" algn="ctr" rotWithShape="0">
-                    <a:srgbClr val="000000">
-                      <a:alpha val="43137"/>
-                    </a:srgbClr>
-                  </a:outerShdw>
-                </a:effectLst>
-              </a:rPr>
-              <a:t>LOGIN</a:t>
-            </a:r>
-          </a:p>
-        </p:txBody>
-      </p:sp>
-      <p:sp>
-        <p:nvSpPr>
-          <p:cNvPr id="8" name="Rounded Rectangle 7"/>
+            <a:endParaRPr lang="en-US" dirty="0" smtClean="0">
+              <a:solidFill>
+                <a:schemeClr val="bg1">
+                  <a:lumMod val="75000"/>
+                </a:schemeClr>
+              </a:solidFill>
+              <a:effectLst>
+                <a:outerShdw blurRad="50800" dist="177800" dir="4080000" algn="ctr" rotWithShape="0">
+                  <a:srgbClr val="000000">
+                    <a:alpha val="43137"/>
+                  </a:srgbClr>
+                </a:outerShdw>
+              </a:effectLst>
+            </a:endParaRPr>
+          </a:p>
+        </p:txBody>
+      </p:sp>
+      <p:pic>
+        <p:nvPicPr>
+          <p:cNvPr id="10" name="Picture 9"/>
+          <p:cNvPicPr>
+            <a:picLocks noChangeAspect="1"/>
+          </p:cNvPicPr>
+          <p:nvPr/>
+        </p:nvPicPr>
+        <p:blipFill>
+          <a:blip r:embed="rId3">
+            <a:extLst>
+              <a:ext uri="{28A0092B-C50C-407E-A947-70E740481C1C}">
+                <a14:useLocalDpi xmlns:a14="http://schemas.microsoft.com/office/drawing/2010/main" val="0"/>
+              </a:ext>
+            </a:extLst>
+          </a:blip>
+          <a:stretch>
+            <a:fillRect/>
+          </a:stretch>
+        </p:blipFill>
+        <p:spPr>
+          <a:xfrm>
+            <a:off x="4637578" y="1380173"/>
+            <a:ext cx="2050676" cy="1285875"/>
+          </a:xfrm>
+          <a:prstGeom prst="rect">
+            <a:avLst/>
+          </a:prstGeom>
+          <a:effectLst>
+            <a:glow rad="101600">
+              <a:schemeClr val="accent3">
+                <a:satMod val="175000"/>
+                <a:alpha val="40000"/>
+              </a:schemeClr>
+            </a:glow>
+            <a:outerShdw blurRad="50800" dist="88900" dir="2760000" algn="ctr" rotWithShape="0">
+              <a:srgbClr val="000000">
+                <a:alpha val="43137"/>
+              </a:srgbClr>
+            </a:outerShdw>
+          </a:effectLst>
+        </p:spPr>
+      </p:pic>
+      <p:sp>
+        <p:nvSpPr>
+          <p:cNvPr id="13" name="Rounded Rectangle 12"/>
           <p:cNvSpPr/>
           <p:nvPr/>
         </p:nvSpPr>
         <p:spPr>
           <a:xfrm>
-            <a:off x="4194810" y="3268980"/>
+            <a:off x="4167290" y="3535799"/>
             <a:ext cx="2937510" cy="457200"/>
           </a:xfrm>
           <a:prstGeom prst="roundRect">
@@ -4321,99 +4402,7 @@
             <a:pPr algn="ctr"/>
             <a:r>
               <a:rPr lang="en-US" dirty="0" smtClean="0"/>
-              <a:t>Username Text</a:t>
-            </a:r>
-            <a:endParaRPr lang="en-US" dirty="0"/>
-          </a:p>
-        </p:txBody>
-      </p:sp>
-      <p:pic>
-        <p:nvPicPr>
-          <p:cNvPr id="10" name="Picture 9"/>
-          <p:cNvPicPr>
-            <a:picLocks noChangeAspect="1"/>
-          </p:cNvPicPr>
-          <p:nvPr/>
-        </p:nvPicPr>
-        <p:blipFill>
-          <a:blip r:embed="rId3">
-            <a:extLst>
-              <a:ext uri="{28A0092B-C50C-407E-A947-70E740481C1C}">
-                <a14:useLocalDpi xmlns:a14="http://schemas.microsoft.com/office/drawing/2010/main" val="0"/>
-              </a:ext>
-            </a:extLst>
-          </a:blip>
-          <a:stretch>
-            <a:fillRect/>
-          </a:stretch>
-        </p:blipFill>
-        <p:spPr>
-          <a:xfrm>
-            <a:off x="4637578" y="1380173"/>
-            <a:ext cx="2050676" cy="1285875"/>
-          </a:xfrm>
-          <a:prstGeom prst="rect">
-            <a:avLst/>
-          </a:prstGeom>
-          <a:effectLst>
-            <a:glow rad="101600">
-              <a:schemeClr val="accent3">
-                <a:satMod val="175000"/>
-                <a:alpha val="40000"/>
-              </a:schemeClr>
-            </a:glow>
-            <a:outerShdw blurRad="50800" dist="88900" dir="2760000" algn="ctr" rotWithShape="0">
-              <a:srgbClr val="000000">
-                <a:alpha val="43137"/>
-              </a:srgbClr>
-            </a:outerShdw>
-          </a:effectLst>
-        </p:spPr>
-      </p:pic>
-      <p:sp>
-        <p:nvSpPr>
-          <p:cNvPr id="13" name="Rounded Rectangle 12"/>
-          <p:cNvSpPr/>
-          <p:nvPr/>
-        </p:nvSpPr>
-        <p:spPr>
-          <a:xfrm>
-            <a:off x="4194810" y="3834765"/>
-            <a:ext cx="2937510" cy="457200"/>
-          </a:xfrm>
-          <a:prstGeom prst="roundRect">
-            <a:avLst/>
-          </a:prstGeom>
-          <a:effectLst>
-            <a:outerShdw blurRad="50800" dist="25400" dir="2880000" algn="ctr" rotWithShape="0">
-              <a:srgbClr val="000000">
-                <a:alpha val="43137"/>
-              </a:srgbClr>
-            </a:outerShdw>
-          </a:effectLst>
-        </p:spPr>
-        <p:style>
-          <a:lnRef idx="1">
-            <a:schemeClr val="dk1"/>
-          </a:lnRef>
-          <a:fillRef idx="1003">
-            <a:schemeClr val="lt2"/>
-          </a:fillRef>
-          <a:effectRef idx="1">
-            <a:schemeClr val="dk1"/>
-          </a:effectRef>
-          <a:fontRef idx="minor">
-            <a:schemeClr val="dk1"/>
-          </a:fontRef>
-        </p:style>
-        <p:txBody>
-          <a:bodyPr rtlCol="0" anchor="ctr"/>
-          <a:lstStyle/>
-          <a:p>
-            <a:pPr algn="ctr"/>
-            <a:r>
-              <a:rPr lang="en-US" dirty="0" smtClean="0"/>
-              <a:t>Password Text</a:t>
+              <a:t>Password</a:t>
             </a:r>
           </a:p>
         </p:txBody>
@@ -4426,7 +4415,7 @@
         </p:nvSpPr>
         <p:spPr>
           <a:xfrm>
-            <a:off x="4194810" y="5357098"/>
+            <a:off x="5165787" y="5004554"/>
             <a:ext cx="940515" cy="369332"/>
           </a:xfrm>
           <a:prstGeom prst="rect">
@@ -4482,8 +4471,8 @@
         </p:nvSpPr>
         <p:spPr>
           <a:xfrm>
-            <a:off x="5850061" y="5357098"/>
-            <a:ext cx="1367335" cy="369332"/>
+            <a:off x="4621736" y="5324594"/>
+            <a:ext cx="2082359" cy="369332"/>
           </a:xfrm>
           <a:prstGeom prst="rect">
             <a:avLst/>
@@ -4497,7 +4486,7 @@
           <a:p>
             <a:pPr algn="ctr"/>
             <a:r>
-              <a:rPr lang="en-US" smtClean="0">
+              <a:rPr lang="en-US" dirty="0" smtClean="0">
                 <a:solidFill>
                   <a:schemeClr val="bg1">
                     <a:lumMod val="75000"/>
@@ -4511,7 +4500,7 @@
                   </a:outerShdw>
                 </a:effectLst>
               </a:rPr>
-              <a:t>Forgot Stuff</a:t>
+              <a:t>Forgot Password</a:t>
             </a:r>
             <a:endParaRPr lang="en-US" dirty="0" smtClean="0">
               <a:solidFill>
@@ -4538,7 +4527,7 @@
         </p:nvSpPr>
         <p:spPr>
           <a:xfrm>
-            <a:off x="5076176" y="4840605"/>
+            <a:off x="4351644" y="4583787"/>
             <a:ext cx="1173480" cy="457200"/>
           </a:xfrm>
           <a:prstGeom prst="roundRect">
@@ -4565,10 +4554,196 @@
           <a:p>
             <a:pPr algn="ctr"/>
             <a:r>
-              <a:rPr lang="en-US" smtClean="0"/>
+              <a:rPr lang="en-US" dirty="0" smtClean="0"/>
               <a:t>Facebook</a:t>
             </a:r>
-            <a:endParaRPr lang="en-US" dirty="0" smtClean="0"/>
+          </a:p>
+        </p:txBody>
+      </p:sp>
+      <p:sp>
+        <p:nvSpPr>
+          <p:cNvPr id="17" name="Rounded Rectangle 16"/>
+          <p:cNvSpPr/>
+          <p:nvPr/>
+        </p:nvSpPr>
+        <p:spPr>
+          <a:xfrm>
+            <a:off x="5891339" y="4583787"/>
+            <a:ext cx="1173480" cy="457200"/>
+          </a:xfrm>
+          <a:prstGeom prst="roundRect">
+            <a:avLst/>
+          </a:prstGeom>
+          <a:solidFill>
+            <a:srgbClr val="DD5424"/>
+          </a:solidFill>
+        </p:spPr>
+        <p:style>
+          <a:lnRef idx="1">
+            <a:schemeClr val="accent2"/>
+          </a:lnRef>
+          <a:fillRef idx="2">
+            <a:schemeClr val="accent2"/>
+          </a:fillRef>
+          <a:effectRef idx="1">
+            <a:schemeClr val="accent2"/>
+          </a:effectRef>
+          <a:fontRef idx="minor">
+            <a:schemeClr val="dk1"/>
+          </a:fontRef>
+        </p:style>
+        <p:txBody>
+          <a:bodyPr rtlCol="0" anchor="ctr"/>
+          <a:lstStyle/>
+          <a:p>
+            <a:pPr algn="ctr"/>
+            <a:r>
+              <a:rPr lang="en-US" dirty="0" smtClean="0"/>
+              <a:t>Google</a:t>
+            </a:r>
+          </a:p>
+        </p:txBody>
+      </p:sp>
+      <p:sp>
+        <p:nvSpPr>
+          <p:cNvPr id="18" name="Rounded Rectangle 17"/>
+          <p:cNvSpPr/>
+          <p:nvPr/>
+        </p:nvSpPr>
+        <p:spPr>
+          <a:xfrm>
+            <a:off x="4194161" y="2970014"/>
+            <a:ext cx="2937510" cy="457200"/>
+          </a:xfrm>
+          <a:prstGeom prst="roundRect">
+            <a:avLst/>
+          </a:prstGeom>
+          <a:effectLst>
+            <a:outerShdw blurRad="50800" dist="25400" dir="2880000" algn="ctr" rotWithShape="0">
+              <a:srgbClr val="000000">
+                <a:alpha val="43137"/>
+              </a:srgbClr>
+            </a:outerShdw>
+          </a:effectLst>
+        </p:spPr>
+        <p:style>
+          <a:lnRef idx="1">
+            <a:schemeClr val="dk1"/>
+          </a:lnRef>
+          <a:fillRef idx="1003">
+            <a:schemeClr val="lt2"/>
+          </a:fillRef>
+          <a:effectRef idx="1">
+            <a:schemeClr val="dk1"/>
+          </a:effectRef>
+          <a:fontRef idx="minor">
+            <a:schemeClr val="dk1"/>
+          </a:fontRef>
+        </p:style>
+        <p:txBody>
+          <a:bodyPr rtlCol="0" anchor="ctr"/>
+          <a:lstStyle/>
+          <a:p>
+            <a:pPr algn="ctr"/>
+            <a:r>
+              <a:rPr lang="en-US" dirty="0" smtClean="0"/>
+              <a:t>Username</a:t>
+            </a:r>
+          </a:p>
+        </p:txBody>
+      </p:sp>
+      <p:sp>
+        <p:nvSpPr>
+          <p:cNvPr id="19" name="TextBox 18"/>
+          <p:cNvSpPr txBox="1"/>
+          <p:nvPr/>
+        </p:nvSpPr>
+        <p:spPr>
+          <a:xfrm>
+            <a:off x="331470" y="502920"/>
+            <a:ext cx="2251710" cy="584775"/>
+          </a:xfrm>
+          <a:prstGeom prst="rect">
+            <a:avLst/>
+          </a:prstGeom>
+          <a:noFill/>
+        </p:spPr>
+        <p:txBody>
+          <a:bodyPr wrap="square" rtlCol="0">
+            <a:spAutoFit/>
+          </a:bodyPr>
+          <a:lstStyle/>
+          <a:p>
+            <a:pPr algn="ctr"/>
+            <a:r>
+              <a:rPr lang="en-US" sz="3200" u="sng" dirty="0" smtClean="0">
+                <a:latin typeface="Arial" charset="0"/>
+                <a:ea typeface="Arial" charset="0"/>
+                <a:cs typeface="Arial" charset="0"/>
+              </a:rPr>
+              <a:t>Login Page</a:t>
+            </a:r>
+            <a:endParaRPr lang="en-US" sz="3200" u="sng" dirty="0">
+              <a:latin typeface="Arial" charset="0"/>
+              <a:ea typeface="Arial" charset="0"/>
+              <a:cs typeface="Arial" charset="0"/>
+            </a:endParaRPr>
+          </a:p>
+        </p:txBody>
+      </p:sp>
+      <p:sp>
+        <p:nvSpPr>
+          <p:cNvPr id="20" name="Rectangle 19"/>
+          <p:cNvSpPr/>
+          <p:nvPr/>
+        </p:nvSpPr>
+        <p:spPr>
+          <a:xfrm>
+            <a:off x="5294379" y="4128373"/>
+            <a:ext cx="782522" cy="369332"/>
+          </a:xfrm>
+          <a:prstGeom prst="rect">
+            <a:avLst/>
+          </a:prstGeom>
+        </p:spPr>
+        <p:txBody>
+          <a:bodyPr wrap="none">
+            <a:spAutoFit/>
+          </a:bodyPr>
+          <a:lstStyle/>
+          <a:p>
+            <a:pPr algn="ctr"/>
+            <a:r>
+              <a:rPr lang="en-US" dirty="0" smtClean="0">
+                <a:solidFill>
+                  <a:schemeClr val="bg1">
+                    <a:lumMod val="75000"/>
+                  </a:schemeClr>
+                </a:solidFill>
+                <a:effectLst>
+                  <a:outerShdw blurRad="50800" dist="177800" dir="4080000" sx="105000" sy="105000" algn="ctr" rotWithShape="0">
+                    <a:srgbClr val="000000">
+                      <a:alpha val="43137"/>
+                    </a:srgbClr>
+                  </a:outerShdw>
+                </a:effectLst>
+              </a:rPr>
+              <a:t>LOGIN</a:t>
+            </a:r>
+            <a:endParaRPr lang="en-US" dirty="0" smtClean="0">
+              <a:solidFill>
+                <a:schemeClr val="bg1">
+                  <a:lumMod val="75000"/>
+                </a:schemeClr>
+              </a:solidFill>
+              <a:effectLst>
+                <a:outerShdw blurRad="50800" dist="177800" dir="4080000" sx="105000" sy="105000" algn="ctr" rotWithShape="0">
+                  <a:srgbClr val="000000">
+                    <a:alpha val="43137"/>
+                  </a:srgbClr>
+                </a:outerShdw>
+              </a:effectLst>
+            </a:endParaRPr>
           </a:p>
         </p:txBody>
       </p:sp>
@@ -4609,23 +4784,922 @@
           <a:chExt cx="0" cy="0"/>
         </a:xfrm>
       </p:grpSpPr>
-      <p:sp>
-        <p:nvSpPr>
-          <p:cNvPr id="5" name="Rounded Rectangle 4"/>
+      <p:pic>
+        <p:nvPicPr>
+          <p:cNvPr id="4" name="Picture 3"/>
+          <p:cNvPicPr>
+            <a:picLocks noChangeAspect="1"/>
+          </p:cNvPicPr>
+          <p:nvPr/>
+        </p:nvPicPr>
+        <p:blipFill>
+          <a:blip r:embed="rId3">
+            <a:extLst>
+              <a:ext uri="{28A0092B-C50C-407E-A947-70E740481C1C}">
+                <a14:useLocalDpi xmlns:a14="http://schemas.microsoft.com/office/drawing/2010/main" val="0"/>
+              </a:ext>
+            </a:extLst>
+          </a:blip>
+          <a:stretch>
+            <a:fillRect/>
+          </a:stretch>
+        </p:blipFill>
+        <p:spPr>
+          <a:xfrm>
+            <a:off x="3945890" y="0"/>
+            <a:ext cx="3440545" cy="6858000"/>
+          </a:xfrm>
+          <a:prstGeom prst="rect">
+            <a:avLst/>
+          </a:prstGeom>
+        </p:spPr>
+      </p:pic>
+      <p:sp>
+        <p:nvSpPr>
+          <p:cNvPr id="7" name="Rectangle 6"/>
           <p:cNvSpPr/>
           <p:nvPr/>
         </p:nvSpPr>
         <p:spPr>
           <a:xfrm>
-            <a:off x="4116651" y="210312"/>
-            <a:ext cx="4114800" cy="6318504"/>
+            <a:off x="4103370" y="765810"/>
+            <a:ext cx="3143250" cy="4926329"/>
+          </a:xfrm>
+          <a:prstGeom prst="rect">
+            <a:avLst/>
+          </a:prstGeom>
+        </p:spPr>
+        <p:style>
+          <a:lnRef idx="2">
+            <a:schemeClr val="accent1">
+              <a:shade val="50000"/>
+            </a:schemeClr>
+          </a:lnRef>
+          <a:fillRef idx="1003">
+            <a:schemeClr val="dk2"/>
+          </a:fillRef>
+          <a:effectRef idx="0">
+            <a:schemeClr val="accent1"/>
+          </a:effectRef>
+          <a:fontRef idx="minor">
+            <a:schemeClr val="lt1"/>
+          </a:fontRef>
+        </p:style>
+        <p:txBody>
+          <a:bodyPr rtlCol="0" anchor="ctr"/>
+          <a:lstStyle/>
+          <a:p>
+            <a:pPr algn="ctr"/>
+            <a:endParaRPr lang="en-US" dirty="0" smtClean="0">
+              <a:solidFill>
+                <a:schemeClr val="bg1">
+                  <a:lumMod val="75000"/>
+                </a:schemeClr>
+              </a:solidFill>
+              <a:effectLst>
+                <a:outerShdw blurRad="50800" dist="177800" dir="4080000" algn="ctr" rotWithShape="0">
+                  <a:srgbClr val="000000">
+                    <a:alpha val="43137"/>
+                  </a:srgbClr>
+                </a:outerShdw>
+              </a:effectLst>
+            </a:endParaRPr>
+          </a:p>
+          <a:p>
+            <a:pPr algn="ctr"/>
+            <a:endParaRPr lang="en-US" dirty="0" smtClean="0">
+              <a:solidFill>
+                <a:schemeClr val="bg1">
+                  <a:lumMod val="75000"/>
+                </a:schemeClr>
+              </a:solidFill>
+              <a:effectLst>
+                <a:outerShdw blurRad="50800" dist="177800" dir="4080000" algn="ctr" rotWithShape="0">
+                  <a:srgbClr val="000000">
+                    <a:alpha val="43137"/>
+                  </a:srgbClr>
+                </a:outerShdw>
+              </a:effectLst>
+            </a:endParaRPr>
+          </a:p>
+          <a:p>
+            <a:pPr algn="ctr"/>
+            <a:endParaRPr lang="en-US" dirty="0" smtClean="0">
+              <a:solidFill>
+                <a:schemeClr val="bg1">
+                  <a:lumMod val="75000"/>
+                </a:schemeClr>
+              </a:solidFill>
+              <a:effectLst>
+                <a:outerShdw blurRad="50800" dist="177800" dir="4080000" algn="ctr" rotWithShape="0">
+                  <a:srgbClr val="000000">
+                    <a:alpha val="43137"/>
+                  </a:srgbClr>
+                </a:outerShdw>
+              </a:effectLst>
+            </a:endParaRPr>
+          </a:p>
+          <a:p>
+            <a:pPr algn="ctr"/>
+            <a:endParaRPr lang="en-US" dirty="0" smtClean="0">
+              <a:solidFill>
+                <a:schemeClr val="bg1">
+                  <a:lumMod val="75000"/>
+                </a:schemeClr>
+              </a:solidFill>
+              <a:effectLst>
+                <a:outerShdw blurRad="50800" dist="177800" dir="4080000" algn="ctr" rotWithShape="0">
+                  <a:srgbClr val="000000">
+                    <a:alpha val="43137"/>
+                  </a:srgbClr>
+                </a:outerShdw>
+              </a:effectLst>
+            </a:endParaRPr>
+          </a:p>
+          <a:p>
+            <a:pPr algn="ctr"/>
+            <a:endParaRPr lang="en-US" dirty="0" smtClean="0">
+              <a:solidFill>
+                <a:schemeClr val="bg1">
+                  <a:lumMod val="75000"/>
+                </a:schemeClr>
+              </a:solidFill>
+              <a:effectLst>
+                <a:outerShdw blurRad="50800" dist="177800" dir="4080000" algn="ctr" rotWithShape="0">
+                  <a:srgbClr val="000000">
+                    <a:alpha val="43137"/>
+                  </a:srgbClr>
+                </a:outerShdw>
+              </a:effectLst>
+            </a:endParaRPr>
+          </a:p>
+          <a:p>
+            <a:pPr algn="ctr"/>
+            <a:endParaRPr lang="en-US" dirty="0" smtClean="0">
+              <a:solidFill>
+                <a:schemeClr val="bg1">
+                  <a:lumMod val="75000"/>
+                </a:schemeClr>
+              </a:solidFill>
+              <a:effectLst>
+                <a:outerShdw blurRad="50800" dist="177800" dir="4080000" algn="ctr" rotWithShape="0">
+                  <a:srgbClr val="000000">
+                    <a:alpha val="43137"/>
+                  </a:srgbClr>
+                </a:outerShdw>
+              </a:effectLst>
+            </a:endParaRPr>
+          </a:p>
+          <a:p>
+            <a:pPr algn="ctr"/>
+            <a:endParaRPr lang="en-US" dirty="0" smtClean="0">
+              <a:solidFill>
+                <a:schemeClr val="bg1">
+                  <a:lumMod val="75000"/>
+                </a:schemeClr>
+              </a:solidFill>
+              <a:effectLst>
+                <a:outerShdw blurRad="50800" dist="177800" dir="4080000" algn="ctr" rotWithShape="0">
+                  <a:srgbClr val="000000">
+                    <a:alpha val="43137"/>
+                  </a:srgbClr>
+                </a:outerShdw>
+              </a:effectLst>
+            </a:endParaRPr>
+          </a:p>
+          <a:p>
+            <a:pPr algn="ctr"/>
+            <a:endParaRPr lang="en-US" dirty="0" smtClean="0">
+              <a:solidFill>
+                <a:schemeClr val="bg1">
+                  <a:lumMod val="75000"/>
+                </a:schemeClr>
+              </a:solidFill>
+              <a:effectLst>
+                <a:outerShdw blurRad="50800" dist="177800" dir="4080000" algn="ctr" rotWithShape="0">
+                  <a:srgbClr val="000000">
+                    <a:alpha val="43137"/>
+                  </a:srgbClr>
+                </a:outerShdw>
+              </a:effectLst>
+            </a:endParaRPr>
+          </a:p>
+          <a:p>
+            <a:pPr algn="ctr"/>
+            <a:endParaRPr lang="en-US" dirty="0" smtClean="0">
+              <a:solidFill>
+                <a:schemeClr val="bg1">
+                  <a:lumMod val="75000"/>
+                </a:schemeClr>
+              </a:solidFill>
+              <a:effectLst>
+                <a:outerShdw blurRad="50800" dist="177800" dir="4080000" algn="ctr" rotWithShape="0">
+                  <a:srgbClr val="000000">
+                    <a:alpha val="43137"/>
+                  </a:srgbClr>
+                </a:outerShdw>
+              </a:effectLst>
+            </a:endParaRPr>
+          </a:p>
+          <a:p>
+            <a:pPr algn="ctr"/>
+            <a:endParaRPr lang="en-US" dirty="0" smtClean="0">
+              <a:solidFill>
+                <a:schemeClr val="bg1">
+                  <a:lumMod val="75000"/>
+                </a:schemeClr>
+              </a:solidFill>
+              <a:effectLst>
+                <a:outerShdw blurRad="50800" dist="177800" dir="4080000" algn="ctr" rotWithShape="0">
+                  <a:srgbClr val="000000">
+                    <a:alpha val="43137"/>
+                  </a:srgbClr>
+                </a:outerShdw>
+              </a:effectLst>
+            </a:endParaRPr>
+          </a:p>
+        </p:txBody>
+      </p:sp>
+      <p:sp>
+        <p:nvSpPr>
+          <p:cNvPr id="2" name="TextBox 1"/>
+          <p:cNvSpPr txBox="1"/>
+          <p:nvPr/>
+        </p:nvSpPr>
+        <p:spPr>
+          <a:xfrm>
+            <a:off x="5166360" y="2114550"/>
+            <a:ext cx="184731" cy="369332"/>
+          </a:xfrm>
+          <a:prstGeom prst="rect">
+            <a:avLst/>
+          </a:prstGeom>
+          <a:noFill/>
+        </p:spPr>
+        <p:txBody>
+          <a:bodyPr wrap="none" rtlCol="0">
+            <a:spAutoFit/>
+          </a:bodyPr>
+          <a:lstStyle/>
+          <a:p>
+            <a:endParaRPr lang="en-US" dirty="0"/>
+          </a:p>
+        </p:txBody>
+      </p:sp>
+      <p:sp>
+        <p:nvSpPr>
+          <p:cNvPr id="22" name="Rounded Rectangle 21"/>
+          <p:cNvSpPr/>
+          <p:nvPr/>
+        </p:nvSpPr>
+        <p:spPr>
+          <a:xfrm>
+            <a:off x="4206239" y="2090261"/>
+            <a:ext cx="2937510" cy="325755"/>
           </a:xfrm>
           <a:prstGeom prst="roundRect">
             <a:avLst/>
           </a:prstGeom>
-          <a:solidFill>
-            <a:schemeClr val="bg1"/>
-          </a:solidFill>
+          <a:gradFill>
+            <a:gsLst>
+              <a:gs pos="0">
+                <a:schemeClr val="lt2">
+                  <a:tint val="93000"/>
+                  <a:satMod val="150000"/>
+                  <a:shade val="98000"/>
+                  <a:lumMod val="102000"/>
+                </a:schemeClr>
+              </a:gs>
+              <a:gs pos="50000">
+                <a:schemeClr val="lt2">
+                  <a:tint val="98000"/>
+                  <a:satMod val="130000"/>
+                  <a:shade val="90000"/>
+                  <a:lumMod val="103000"/>
+                </a:schemeClr>
+              </a:gs>
+              <a:gs pos="100000">
+                <a:schemeClr val="bg2"/>
+              </a:gs>
+            </a:gsLst>
+          </a:gradFill>
+          <a:effectLst>
+            <a:outerShdw blurRad="50800" dist="25400" dir="2880000" algn="ctr" rotWithShape="0">
+              <a:srgbClr val="000000">
+                <a:alpha val="43137"/>
+              </a:srgbClr>
+            </a:outerShdw>
+          </a:effectLst>
+        </p:spPr>
+        <p:style>
+          <a:lnRef idx="1">
+            <a:schemeClr val="dk1"/>
+          </a:lnRef>
+          <a:fillRef idx="1003">
+            <a:schemeClr val="lt2"/>
+          </a:fillRef>
+          <a:effectRef idx="1">
+            <a:schemeClr val="dk1"/>
+          </a:effectRef>
+          <a:fontRef idx="minor">
+            <a:schemeClr val="dk1"/>
+          </a:fontRef>
+        </p:style>
+        <p:txBody>
+          <a:bodyPr rtlCol="0" anchor="ctr"/>
+          <a:lstStyle/>
+          <a:p>
+            <a:pPr algn="ctr"/>
+            <a:r>
+              <a:rPr lang="en-US" smtClean="0"/>
+              <a:t>First Name</a:t>
+            </a:r>
+            <a:endParaRPr lang="en-US" dirty="0"/>
+          </a:p>
+        </p:txBody>
+      </p:sp>
+      <p:sp>
+        <p:nvSpPr>
+          <p:cNvPr id="24" name="Rounded Rectangle 23"/>
+          <p:cNvSpPr/>
+          <p:nvPr/>
+        </p:nvSpPr>
+        <p:spPr>
+          <a:xfrm>
+            <a:off x="4206239" y="2487453"/>
+            <a:ext cx="2937510" cy="325755"/>
+          </a:xfrm>
+          <a:prstGeom prst="roundRect">
+            <a:avLst/>
+          </a:prstGeom>
+          <a:gradFill>
+            <a:gsLst>
+              <a:gs pos="0">
+                <a:schemeClr val="lt2">
+                  <a:tint val="93000"/>
+                  <a:satMod val="150000"/>
+                  <a:shade val="98000"/>
+                  <a:lumMod val="102000"/>
+                </a:schemeClr>
+              </a:gs>
+              <a:gs pos="50000">
+                <a:schemeClr val="lt2">
+                  <a:tint val="98000"/>
+                  <a:satMod val="130000"/>
+                  <a:shade val="90000"/>
+                  <a:lumMod val="103000"/>
+                </a:schemeClr>
+              </a:gs>
+              <a:gs pos="100000">
+                <a:schemeClr val="bg2"/>
+              </a:gs>
+            </a:gsLst>
+          </a:gradFill>
+          <a:effectLst>
+            <a:outerShdw blurRad="50800" dist="25400" dir="2880000" algn="ctr" rotWithShape="0">
+              <a:srgbClr val="000000">
+                <a:alpha val="43137"/>
+              </a:srgbClr>
+            </a:outerShdw>
+          </a:effectLst>
+        </p:spPr>
+        <p:style>
+          <a:lnRef idx="1">
+            <a:schemeClr val="dk1"/>
+          </a:lnRef>
+          <a:fillRef idx="1003">
+            <a:schemeClr val="lt2"/>
+          </a:fillRef>
+          <a:effectRef idx="1">
+            <a:schemeClr val="dk1"/>
+          </a:effectRef>
+          <a:fontRef idx="minor">
+            <a:schemeClr val="dk1"/>
+          </a:fontRef>
+        </p:style>
+        <p:txBody>
+          <a:bodyPr rtlCol="0" anchor="ctr"/>
+          <a:lstStyle/>
+          <a:p>
+            <a:pPr algn="ctr"/>
+            <a:r>
+              <a:rPr lang="en-US" dirty="0" smtClean="0"/>
+              <a:t>Last Name</a:t>
+            </a:r>
+            <a:endParaRPr lang="en-US" dirty="0"/>
+          </a:p>
+        </p:txBody>
+      </p:sp>
+      <p:sp>
+        <p:nvSpPr>
+          <p:cNvPr id="25" name="Rounded Rectangle 24"/>
+          <p:cNvSpPr/>
+          <p:nvPr/>
+        </p:nvSpPr>
+        <p:spPr>
+          <a:xfrm>
+            <a:off x="4206239" y="2896076"/>
+            <a:ext cx="2937510" cy="325755"/>
+          </a:xfrm>
+          <a:prstGeom prst="roundRect">
+            <a:avLst/>
+          </a:prstGeom>
+          <a:gradFill>
+            <a:gsLst>
+              <a:gs pos="0">
+                <a:schemeClr val="lt2">
+                  <a:tint val="93000"/>
+                  <a:satMod val="150000"/>
+                  <a:shade val="98000"/>
+                  <a:lumMod val="102000"/>
+                </a:schemeClr>
+              </a:gs>
+              <a:gs pos="50000">
+                <a:schemeClr val="lt2">
+                  <a:tint val="98000"/>
+                  <a:satMod val="130000"/>
+                  <a:shade val="90000"/>
+                  <a:lumMod val="103000"/>
+                </a:schemeClr>
+              </a:gs>
+              <a:gs pos="100000">
+                <a:schemeClr val="bg2"/>
+              </a:gs>
+            </a:gsLst>
+          </a:gradFill>
+          <a:effectLst>
+            <a:outerShdw blurRad="50800" dist="25400" dir="2880000" algn="ctr" rotWithShape="0">
+              <a:srgbClr val="000000">
+                <a:alpha val="43137"/>
+              </a:srgbClr>
+            </a:outerShdw>
+          </a:effectLst>
+        </p:spPr>
+        <p:style>
+          <a:lnRef idx="1">
+            <a:schemeClr val="dk1"/>
+          </a:lnRef>
+          <a:fillRef idx="1003">
+            <a:schemeClr val="lt2"/>
+          </a:fillRef>
+          <a:effectRef idx="1">
+            <a:schemeClr val="dk1"/>
+          </a:effectRef>
+          <a:fontRef idx="minor">
+            <a:schemeClr val="dk1"/>
+          </a:fontRef>
+        </p:style>
+        <p:txBody>
+          <a:bodyPr rtlCol="0" anchor="ctr"/>
+          <a:lstStyle/>
+          <a:p>
+            <a:pPr algn="ctr"/>
+            <a:r>
+              <a:rPr lang="en-US" smtClean="0"/>
+              <a:t>Email</a:t>
+            </a:r>
+            <a:endParaRPr lang="en-US" dirty="0"/>
+          </a:p>
+        </p:txBody>
+      </p:sp>
+      <p:sp>
+        <p:nvSpPr>
+          <p:cNvPr id="26" name="Rounded Rectangle 25"/>
+          <p:cNvSpPr/>
+          <p:nvPr/>
+        </p:nvSpPr>
+        <p:spPr>
+          <a:xfrm>
+            <a:off x="4206239" y="3304699"/>
+            <a:ext cx="2937510" cy="325755"/>
+          </a:xfrm>
+          <a:prstGeom prst="roundRect">
+            <a:avLst/>
+          </a:prstGeom>
+          <a:gradFill>
+            <a:gsLst>
+              <a:gs pos="0">
+                <a:schemeClr val="lt2">
+                  <a:tint val="93000"/>
+                  <a:satMod val="150000"/>
+                  <a:shade val="98000"/>
+                  <a:lumMod val="102000"/>
+                </a:schemeClr>
+              </a:gs>
+              <a:gs pos="50000">
+                <a:schemeClr val="lt2">
+                  <a:tint val="98000"/>
+                  <a:satMod val="130000"/>
+                  <a:shade val="90000"/>
+                  <a:lumMod val="103000"/>
+                </a:schemeClr>
+              </a:gs>
+              <a:gs pos="100000">
+                <a:schemeClr val="bg2"/>
+              </a:gs>
+            </a:gsLst>
+          </a:gradFill>
+          <a:effectLst>
+            <a:outerShdw blurRad="50800" dist="25400" dir="2880000" algn="ctr" rotWithShape="0">
+              <a:srgbClr val="000000">
+                <a:alpha val="43137"/>
+              </a:srgbClr>
+            </a:outerShdw>
+          </a:effectLst>
+        </p:spPr>
+        <p:style>
+          <a:lnRef idx="1">
+            <a:schemeClr val="dk1"/>
+          </a:lnRef>
+          <a:fillRef idx="1003">
+            <a:schemeClr val="lt2"/>
+          </a:fillRef>
+          <a:effectRef idx="1">
+            <a:schemeClr val="dk1"/>
+          </a:effectRef>
+          <a:fontRef idx="minor">
+            <a:schemeClr val="dk1"/>
+          </a:fontRef>
+        </p:style>
+        <p:txBody>
+          <a:bodyPr rtlCol="0" anchor="ctr"/>
+          <a:lstStyle/>
+          <a:p>
+            <a:pPr algn="ctr"/>
+            <a:r>
+              <a:rPr lang="en-US" dirty="0" smtClean="0"/>
+              <a:t>Phone Number</a:t>
+            </a:r>
+            <a:endParaRPr lang="en-US" dirty="0"/>
+          </a:p>
+        </p:txBody>
+      </p:sp>
+      <p:sp>
+        <p:nvSpPr>
+          <p:cNvPr id="27" name="Rounded Rectangle 26"/>
+          <p:cNvSpPr/>
+          <p:nvPr/>
+        </p:nvSpPr>
+        <p:spPr>
+          <a:xfrm>
+            <a:off x="4206239" y="3701891"/>
+            <a:ext cx="2937510" cy="325755"/>
+          </a:xfrm>
+          <a:prstGeom prst="roundRect">
+            <a:avLst/>
+          </a:prstGeom>
+          <a:gradFill>
+            <a:gsLst>
+              <a:gs pos="0">
+                <a:schemeClr val="lt2">
+                  <a:tint val="93000"/>
+                  <a:satMod val="150000"/>
+                  <a:shade val="98000"/>
+                  <a:lumMod val="102000"/>
+                </a:schemeClr>
+              </a:gs>
+              <a:gs pos="50000">
+                <a:schemeClr val="lt2">
+                  <a:tint val="98000"/>
+                  <a:satMod val="130000"/>
+                  <a:shade val="90000"/>
+                  <a:lumMod val="103000"/>
+                </a:schemeClr>
+              </a:gs>
+              <a:gs pos="100000">
+                <a:schemeClr val="bg2"/>
+              </a:gs>
+            </a:gsLst>
+          </a:gradFill>
+          <a:effectLst>
+            <a:outerShdw blurRad="50800" dist="25400" dir="2880000" algn="ctr" rotWithShape="0">
+              <a:srgbClr val="000000">
+                <a:alpha val="43137"/>
+              </a:srgbClr>
+            </a:outerShdw>
+          </a:effectLst>
+        </p:spPr>
+        <p:style>
+          <a:lnRef idx="1">
+            <a:schemeClr val="dk1"/>
+          </a:lnRef>
+          <a:fillRef idx="1003">
+            <a:schemeClr val="lt2"/>
+          </a:fillRef>
+          <a:effectRef idx="1">
+            <a:schemeClr val="dk1"/>
+          </a:effectRef>
+          <a:fontRef idx="minor">
+            <a:schemeClr val="dk1"/>
+          </a:fontRef>
+        </p:style>
+        <p:txBody>
+          <a:bodyPr rtlCol="0" anchor="ctr"/>
+          <a:lstStyle/>
+          <a:p>
+            <a:pPr algn="ctr"/>
+            <a:r>
+              <a:rPr lang="en-US" dirty="0" smtClean="0"/>
+              <a:t>Zip-Code</a:t>
+            </a:r>
+            <a:endParaRPr lang="en-US" dirty="0"/>
+          </a:p>
+        </p:txBody>
+      </p:sp>
+      <p:sp>
+        <p:nvSpPr>
+          <p:cNvPr id="28" name="Rounded Rectangle 27"/>
+          <p:cNvSpPr/>
+          <p:nvPr/>
+        </p:nvSpPr>
+        <p:spPr>
+          <a:xfrm>
+            <a:off x="4206239" y="4099083"/>
+            <a:ext cx="2937510" cy="325755"/>
+          </a:xfrm>
+          <a:prstGeom prst="roundRect">
+            <a:avLst/>
+          </a:prstGeom>
+          <a:gradFill>
+            <a:gsLst>
+              <a:gs pos="0">
+                <a:schemeClr val="lt2">
+                  <a:tint val="93000"/>
+                  <a:satMod val="150000"/>
+                  <a:shade val="98000"/>
+                  <a:lumMod val="102000"/>
+                </a:schemeClr>
+              </a:gs>
+              <a:gs pos="50000">
+                <a:schemeClr val="lt2">
+                  <a:tint val="98000"/>
+                  <a:satMod val="130000"/>
+                  <a:shade val="90000"/>
+                  <a:lumMod val="103000"/>
+                </a:schemeClr>
+              </a:gs>
+              <a:gs pos="100000">
+                <a:schemeClr val="bg2"/>
+              </a:gs>
+            </a:gsLst>
+          </a:gradFill>
+          <a:effectLst>
+            <a:outerShdw blurRad="50800" dist="25400" dir="2880000" algn="ctr" rotWithShape="0">
+              <a:srgbClr val="000000">
+                <a:alpha val="43137"/>
+              </a:srgbClr>
+            </a:outerShdw>
+          </a:effectLst>
+        </p:spPr>
+        <p:style>
+          <a:lnRef idx="1">
+            <a:schemeClr val="dk1"/>
+          </a:lnRef>
+          <a:fillRef idx="1003">
+            <a:schemeClr val="lt2"/>
+          </a:fillRef>
+          <a:effectRef idx="1">
+            <a:schemeClr val="dk1"/>
+          </a:effectRef>
+          <a:fontRef idx="minor">
+            <a:schemeClr val="dk1"/>
+          </a:fontRef>
+        </p:style>
+        <p:txBody>
+          <a:bodyPr rtlCol="0" anchor="ctr"/>
+          <a:lstStyle/>
+          <a:p>
+            <a:pPr algn="ctr"/>
+            <a:r>
+              <a:rPr lang="en-US" smtClean="0"/>
+              <a:t>Password</a:t>
+            </a:r>
+            <a:endParaRPr lang="en-US" dirty="0"/>
+          </a:p>
+        </p:txBody>
+      </p:sp>
+      <p:sp>
+        <p:nvSpPr>
+          <p:cNvPr id="29" name="Rounded Rectangle 28"/>
+          <p:cNvSpPr/>
+          <p:nvPr/>
+        </p:nvSpPr>
+        <p:spPr>
+          <a:xfrm>
+            <a:off x="4206239" y="4490561"/>
+            <a:ext cx="2937510" cy="325755"/>
+          </a:xfrm>
+          <a:prstGeom prst="roundRect">
+            <a:avLst/>
+          </a:prstGeom>
+          <a:gradFill>
+            <a:gsLst>
+              <a:gs pos="0">
+                <a:schemeClr val="lt2">
+                  <a:tint val="93000"/>
+                  <a:satMod val="150000"/>
+                  <a:shade val="98000"/>
+                  <a:lumMod val="102000"/>
+                </a:schemeClr>
+              </a:gs>
+              <a:gs pos="50000">
+                <a:schemeClr val="lt2">
+                  <a:tint val="98000"/>
+                  <a:satMod val="130000"/>
+                  <a:shade val="90000"/>
+                  <a:lumMod val="103000"/>
+                </a:schemeClr>
+              </a:gs>
+              <a:gs pos="100000">
+                <a:schemeClr val="bg2"/>
+              </a:gs>
+            </a:gsLst>
+          </a:gradFill>
+          <a:effectLst>
+            <a:outerShdw blurRad="50800" dist="25400" dir="2880000" algn="ctr" rotWithShape="0">
+              <a:srgbClr val="000000">
+                <a:alpha val="43137"/>
+              </a:srgbClr>
+            </a:outerShdw>
+          </a:effectLst>
+        </p:spPr>
+        <p:style>
+          <a:lnRef idx="1">
+            <a:schemeClr val="dk1"/>
+          </a:lnRef>
+          <a:fillRef idx="1003">
+            <a:schemeClr val="lt2"/>
+          </a:fillRef>
+          <a:effectRef idx="1">
+            <a:schemeClr val="dk1"/>
+          </a:effectRef>
+          <a:fontRef idx="minor">
+            <a:schemeClr val="dk1"/>
+          </a:fontRef>
+        </p:style>
+        <p:txBody>
+          <a:bodyPr rtlCol="0" anchor="ctr"/>
+          <a:lstStyle/>
+          <a:p>
+            <a:pPr algn="ctr"/>
+            <a:r>
+              <a:rPr lang="en-US" dirty="0" smtClean="0"/>
+              <a:t>Confirm Password</a:t>
+            </a:r>
+            <a:endParaRPr lang="en-US" dirty="0"/>
+          </a:p>
+        </p:txBody>
+      </p:sp>
+      <p:sp>
+        <p:nvSpPr>
+          <p:cNvPr id="30" name="Rounded Rectangle 29"/>
+          <p:cNvSpPr/>
+          <p:nvPr/>
+        </p:nvSpPr>
+        <p:spPr>
+          <a:xfrm>
+            <a:off x="4197278" y="1693069"/>
+            <a:ext cx="2937510" cy="325755"/>
+          </a:xfrm>
+          <a:prstGeom prst="roundRect">
+            <a:avLst/>
+          </a:prstGeom>
+          <a:gradFill>
+            <a:gsLst>
+              <a:gs pos="0">
+                <a:schemeClr val="lt2">
+                  <a:tint val="93000"/>
+                  <a:satMod val="150000"/>
+                  <a:shade val="98000"/>
+                  <a:lumMod val="102000"/>
+                </a:schemeClr>
+              </a:gs>
+              <a:gs pos="50000">
+                <a:schemeClr val="lt2">
+                  <a:tint val="98000"/>
+                  <a:satMod val="130000"/>
+                  <a:shade val="90000"/>
+                  <a:lumMod val="103000"/>
+                </a:schemeClr>
+              </a:gs>
+              <a:gs pos="100000">
+                <a:schemeClr val="bg2"/>
+              </a:gs>
+            </a:gsLst>
+          </a:gradFill>
+          <a:effectLst>
+            <a:outerShdw blurRad="50800" dist="25400" dir="2880000" algn="ctr" rotWithShape="0">
+              <a:srgbClr val="000000">
+                <a:alpha val="43137"/>
+              </a:srgbClr>
+            </a:outerShdw>
+          </a:effectLst>
+        </p:spPr>
+        <p:style>
+          <a:lnRef idx="1">
+            <a:schemeClr val="dk1"/>
+          </a:lnRef>
+          <a:fillRef idx="1003">
+            <a:schemeClr val="lt2"/>
+          </a:fillRef>
+          <a:effectRef idx="1">
+            <a:schemeClr val="dk1"/>
+          </a:effectRef>
+          <a:fontRef idx="minor">
+            <a:schemeClr val="dk1"/>
+          </a:fontRef>
+        </p:style>
+        <p:txBody>
+          <a:bodyPr rtlCol="0" anchor="ctr"/>
+          <a:lstStyle/>
+          <a:p>
+            <a:pPr algn="ctr"/>
+            <a:r>
+              <a:rPr lang="en-US" dirty="0" smtClean="0"/>
+              <a:t>Username</a:t>
+            </a:r>
+            <a:endParaRPr lang="en-US" dirty="0"/>
+          </a:p>
+        </p:txBody>
+      </p:sp>
+      <p:sp>
+        <p:nvSpPr>
+          <p:cNvPr id="31" name="Rectangle 30"/>
+          <p:cNvSpPr/>
+          <p:nvPr/>
+        </p:nvSpPr>
+        <p:spPr>
+          <a:xfrm>
+            <a:off x="4576087" y="5301017"/>
+            <a:ext cx="940515" cy="369332"/>
+          </a:xfrm>
+          <a:prstGeom prst="rect">
+            <a:avLst/>
+          </a:prstGeom>
+        </p:spPr>
+        <p:txBody>
+          <a:bodyPr wrap="none">
+            <a:spAutoFit/>
+          </a:bodyPr>
+          <a:lstStyle/>
+          <a:p>
+            <a:pPr algn="ctr"/>
+            <a:r>
+              <a:rPr lang="en-US" dirty="0" smtClean="0">
+                <a:solidFill>
+                  <a:schemeClr val="bg1">
+                    <a:lumMod val="75000"/>
+                  </a:schemeClr>
+                </a:solidFill>
+                <a:effectLst>
+                  <a:outerShdw blurRad="50800" dist="177800" dir="4080000" sx="105000" sy="105000" algn="ctr" rotWithShape="0">
+                    <a:srgbClr val="000000">
+                      <a:alpha val="43137"/>
+                    </a:srgbClr>
+                  </a:outerShdw>
+                </a:effectLst>
+              </a:rPr>
+              <a:t>Register</a:t>
+            </a:r>
+            <a:endParaRPr lang="en-US" dirty="0" smtClean="0">
+              <a:solidFill>
+                <a:schemeClr val="bg1">
+                  <a:lumMod val="75000"/>
+                </a:schemeClr>
+              </a:solidFill>
+              <a:effectLst>
+                <a:outerShdw blurRad="50800" dist="177800" dir="4080000" sx="105000" sy="105000" algn="ctr" rotWithShape="0">
+                  <a:srgbClr val="000000">
+                    <a:alpha val="43137"/>
+                  </a:srgbClr>
+                </a:outerShdw>
+              </a:effectLst>
+            </a:endParaRPr>
+          </a:p>
+        </p:txBody>
+      </p:sp>
+      <p:sp>
+        <p:nvSpPr>
+          <p:cNvPr id="3" name="Rectangle 2"/>
+          <p:cNvSpPr/>
+          <p:nvPr/>
+        </p:nvSpPr>
+        <p:spPr>
+          <a:xfrm>
+            <a:off x="4947339" y="4941867"/>
+            <a:ext cx="240030" cy="233600"/>
+          </a:xfrm>
+          <a:prstGeom prst="rect">
+            <a:avLst/>
+          </a:prstGeom>
+          <a:effectLst>
+            <a:glow rad="63500">
+              <a:schemeClr val="accent3">
+                <a:satMod val="175000"/>
+                <a:alpha val="40000"/>
+              </a:schemeClr>
+            </a:glow>
+          </a:effectLst>
         </p:spPr>
         <p:style>
           <a:lnRef idx="2">
@@ -4660,8 +5734,89 @@
         </p:nvSpPr>
         <p:spPr>
           <a:xfrm>
-            <a:off x="4520565" y="762250"/>
-            <a:ext cx="3383280" cy="584775"/>
+            <a:off x="5166360" y="4920167"/>
+            <a:ext cx="1671420" cy="276999"/>
+          </a:xfrm>
+          <a:prstGeom prst="rect">
+            <a:avLst/>
+          </a:prstGeom>
+          <a:noFill/>
+        </p:spPr>
+        <p:txBody>
+          <a:bodyPr wrap="none" rtlCol="0">
+            <a:spAutoFit/>
+          </a:bodyPr>
+          <a:lstStyle/>
+          <a:p>
+            <a:r>
+              <a:rPr lang="en-US" sz="1200" dirty="0" smtClean="0">
+                <a:solidFill>
+                  <a:schemeClr val="bg1"/>
+                </a:solidFill>
+              </a:rPr>
+              <a:t>Accept User Agreement</a:t>
+            </a:r>
+            <a:endParaRPr lang="en-US" sz="1200" dirty="0">
+              <a:solidFill>
+                <a:schemeClr val="bg1"/>
+              </a:solidFill>
+            </a:endParaRPr>
+          </a:p>
+        </p:txBody>
+      </p:sp>
+      <p:pic>
+        <p:nvPicPr>
+          <p:cNvPr id="32" name="Picture 31"/>
+          <p:cNvPicPr>
+            <a:picLocks noChangeAspect="1"/>
+          </p:cNvPicPr>
+          <p:nvPr/>
+        </p:nvPicPr>
+        <p:blipFill>
+          <a:blip r:embed="rId4">
+            <a:extLst>
+              <a:ext uri="{28A0092B-C50C-407E-A947-70E740481C1C}">
+                <a14:useLocalDpi xmlns:a14="http://schemas.microsoft.com/office/drawing/2010/main" val="0"/>
+              </a:ext>
+            </a:extLst>
+          </a:blip>
+          <a:stretch>
+            <a:fillRect/>
+          </a:stretch>
+        </p:blipFill>
+        <p:spPr>
+          <a:xfrm>
+            <a:off x="5046345" y="773414"/>
+            <a:ext cx="1294592" cy="811773"/>
+          </a:xfrm>
+          <a:prstGeom prst="rect">
+            <a:avLst/>
+          </a:prstGeom>
+          <a:effectLst>
+            <a:glow rad="101600">
+              <a:schemeClr val="accent3">
+                <a:satMod val="175000"/>
+                <a:alpha val="40000"/>
+              </a:schemeClr>
+            </a:glow>
+            <a:outerShdw blurRad="50800" dist="88900" dir="2760000" algn="ctr" rotWithShape="0">
+              <a:srgbClr val="000000">
+                <a:alpha val="43137"/>
+              </a:srgbClr>
+            </a:outerShdw>
+          </a:effectLst>
+        </p:spPr>
+      </p:pic>
+      <p:sp>
+        <p:nvSpPr>
+          <p:cNvPr id="33" name="TextBox 32"/>
+          <p:cNvSpPr txBox="1"/>
+          <p:nvPr/>
+        </p:nvSpPr>
+        <p:spPr>
+          <a:xfrm>
+            <a:off x="331470" y="502920"/>
+            <a:ext cx="2251710" cy="1077218"/>
           </a:xfrm>
           <a:prstGeom prst="rect">
             <a:avLst/>
@@ -4676,459 +5831,67 @@
           <a:p>
             <a:pPr algn="ctr"/>
             <a:r>
-              <a:rPr lang="en-US" sz="3200" dirty="0" smtClean="0"/>
-              <a:t>Who’s </a:t>
-            </a:r>
-            <a:r>
-              <a:rPr lang="en-US" sz="3200" dirty="0" err="1" smtClean="0"/>
-              <a:t>Playin</a:t>
-            </a:r>
-            <a:r>
-              <a:rPr lang="en-US" sz="3200" dirty="0" smtClean="0"/>
-              <a:t>’</a:t>
-            </a:r>
-            <a:endParaRPr lang="en-US" sz="3200" dirty="0"/>
-          </a:p>
-        </p:txBody>
-      </p:sp>
-      <p:sp>
-        <p:nvSpPr>
-          <p:cNvPr id="9" name="TextBox 8"/>
-          <p:cNvSpPr txBox="1"/>
-          <p:nvPr/>
-        </p:nvSpPr>
-        <p:spPr>
-          <a:xfrm>
-            <a:off x="5392239" y="1542288"/>
-            <a:ext cx="1563624" cy="369332"/>
+              <a:rPr lang="en-US" sz="3200" u="sng" dirty="0" smtClean="0">
+                <a:latin typeface="Arial" charset="0"/>
+                <a:ea typeface="Arial" charset="0"/>
+                <a:cs typeface="Arial" charset="0"/>
+              </a:rPr>
+              <a:t>Register Page</a:t>
+            </a:r>
+            <a:endParaRPr lang="en-US" sz="3200" u="sng" dirty="0">
+              <a:latin typeface="Arial" charset="0"/>
+              <a:ea typeface="Arial" charset="0"/>
+              <a:cs typeface="Arial" charset="0"/>
+            </a:endParaRPr>
+          </a:p>
+        </p:txBody>
+      </p:sp>
+      <p:sp>
+        <p:nvSpPr>
+          <p:cNvPr id="34" name="Rectangle 33"/>
+          <p:cNvSpPr/>
+          <p:nvPr/>
+        </p:nvSpPr>
+        <p:spPr>
+          <a:xfrm>
+            <a:off x="5806122" y="5301017"/>
+            <a:ext cx="806631" cy="369332"/>
           </a:xfrm>
           <a:prstGeom prst="rect">
             <a:avLst/>
           </a:prstGeom>
-          <a:noFill/>
-        </p:spPr>
-        <p:txBody>
-          <a:bodyPr wrap="square" rtlCol="0">
+        </p:spPr>
+        <p:txBody>
+          <a:bodyPr wrap="none">
             <a:spAutoFit/>
           </a:bodyPr>
           <a:lstStyle/>
           <a:p>
             <a:pPr algn="ctr"/>
             <a:r>
-              <a:rPr lang="en-US" dirty="0" smtClean="0"/>
-              <a:t>“Logo Here”</a:t>
-            </a:r>
-          </a:p>
-        </p:txBody>
-      </p:sp>
-      <p:sp>
-        <p:nvSpPr>
-          <p:cNvPr id="11" name="Rounded Rectangle 10"/>
-          <p:cNvSpPr/>
-          <p:nvPr/>
-        </p:nvSpPr>
-        <p:spPr>
-          <a:xfrm>
-            <a:off x="5040630" y="2928890"/>
-            <a:ext cx="2343150" cy="411480"/>
-          </a:xfrm>
-          <a:prstGeom prst="roundRect">
-            <a:avLst/>
-          </a:prstGeom>
-        </p:spPr>
-        <p:style>
-          <a:lnRef idx="2">
-            <a:schemeClr val="accent1">
-              <a:shade val="50000"/>
-            </a:schemeClr>
-          </a:lnRef>
-          <a:fillRef idx="1">
-            <a:schemeClr val="accent1"/>
-          </a:fillRef>
-          <a:effectRef idx="0">
-            <a:schemeClr val="accent1"/>
-          </a:effectRef>
-          <a:fontRef idx="minor">
-            <a:schemeClr val="lt1"/>
-          </a:fontRef>
-        </p:style>
-        <p:txBody>
-          <a:bodyPr rtlCol="0" anchor="ctr"/>
-          <a:lstStyle/>
-          <a:p>
-            <a:pPr algn="ctr"/>
-            <a:endParaRPr lang="en-US"/>
-          </a:p>
-        </p:txBody>
-      </p:sp>
-      <p:sp>
-        <p:nvSpPr>
-          <p:cNvPr id="13" name="Rounded Rectangle 12"/>
-          <p:cNvSpPr/>
-          <p:nvPr/>
-        </p:nvSpPr>
-        <p:spPr>
-          <a:xfrm>
-            <a:off x="5040630" y="3536156"/>
-            <a:ext cx="2343150" cy="411480"/>
-          </a:xfrm>
-          <a:prstGeom prst="roundRect">
-            <a:avLst/>
-          </a:prstGeom>
-        </p:spPr>
-        <p:style>
-          <a:lnRef idx="2">
-            <a:schemeClr val="accent1">
-              <a:shade val="50000"/>
-            </a:schemeClr>
-          </a:lnRef>
-          <a:fillRef idx="1">
-            <a:schemeClr val="accent1"/>
-          </a:fillRef>
-          <a:effectRef idx="0">
-            <a:schemeClr val="accent1"/>
-          </a:effectRef>
-          <a:fontRef idx="minor">
-            <a:schemeClr val="lt1"/>
-          </a:fontRef>
-        </p:style>
-        <p:txBody>
-          <a:bodyPr rtlCol="0" anchor="ctr"/>
-          <a:lstStyle/>
-          <a:p>
-            <a:pPr algn="ctr"/>
-            <a:endParaRPr lang="en-US"/>
-          </a:p>
-        </p:txBody>
-      </p:sp>
-      <p:sp>
-        <p:nvSpPr>
-          <p:cNvPr id="14" name="Rounded Rectangle 13"/>
-          <p:cNvSpPr/>
-          <p:nvPr/>
-        </p:nvSpPr>
-        <p:spPr>
-          <a:xfrm>
-            <a:off x="4520565" y="5318903"/>
-            <a:ext cx="1445895" cy="556546"/>
-          </a:xfrm>
-          <a:prstGeom prst="roundRect">
-            <a:avLst/>
-          </a:prstGeom>
-        </p:spPr>
-        <p:style>
-          <a:lnRef idx="2">
-            <a:schemeClr val="accent1">
-              <a:shade val="50000"/>
-            </a:schemeClr>
-          </a:lnRef>
-          <a:fillRef idx="1">
-            <a:schemeClr val="accent1"/>
-          </a:fillRef>
-          <a:effectRef idx="0">
-            <a:schemeClr val="accent1"/>
-          </a:effectRef>
-          <a:fontRef idx="minor">
-            <a:schemeClr val="lt1"/>
-          </a:fontRef>
-        </p:style>
-        <p:txBody>
-          <a:bodyPr rtlCol="0" anchor="ctr"/>
-          <a:lstStyle/>
-          <a:p>
-            <a:pPr algn="ctr"/>
-            <a:endParaRPr lang="en-US"/>
-          </a:p>
-        </p:txBody>
-      </p:sp>
-      <p:sp>
-        <p:nvSpPr>
-          <p:cNvPr id="15" name="TextBox 14"/>
-          <p:cNvSpPr txBox="1"/>
-          <p:nvPr/>
-        </p:nvSpPr>
-        <p:spPr>
-          <a:xfrm>
-            <a:off x="5430393" y="4915900"/>
-            <a:ext cx="1563624" cy="369332"/>
-          </a:xfrm>
-          <a:prstGeom prst="rect">
-            <a:avLst/>
-          </a:prstGeom>
-          <a:noFill/>
-        </p:spPr>
-        <p:txBody>
-          <a:bodyPr wrap="square" rtlCol="0">
-            <a:spAutoFit/>
-          </a:bodyPr>
-          <a:lstStyle/>
-          <a:p>
-            <a:pPr algn="ctr"/>
-            <a:r>
-              <a:rPr lang="en-US" dirty="0" smtClean="0"/>
-              <a:t>Register</a:t>
-            </a:r>
-            <a:endParaRPr lang="en-US" dirty="0"/>
-          </a:p>
-        </p:txBody>
-      </p:sp>
-      <p:sp>
-        <p:nvSpPr>
-          <p:cNvPr id="16" name="TextBox 15"/>
-          <p:cNvSpPr txBox="1"/>
-          <p:nvPr/>
-        </p:nvSpPr>
-        <p:spPr>
-          <a:xfrm>
-            <a:off x="5430393" y="3974270"/>
-            <a:ext cx="1563624" cy="369332"/>
-          </a:xfrm>
-          <a:prstGeom prst="rect">
-            <a:avLst/>
-          </a:prstGeom>
-          <a:noFill/>
-        </p:spPr>
-        <p:txBody>
-          <a:bodyPr wrap="square" rtlCol="0">
-            <a:spAutoFit/>
-          </a:bodyPr>
-          <a:lstStyle/>
-          <a:p>
-            <a:pPr algn="ctr"/>
-            <a:r>
-              <a:rPr lang="en-US" smtClean="0"/>
-              <a:t>Login</a:t>
-            </a:r>
-            <a:endParaRPr lang="en-US" dirty="0"/>
-          </a:p>
-        </p:txBody>
-      </p:sp>
-      <p:sp>
-        <p:nvSpPr>
-          <p:cNvPr id="17" name="TextBox 16"/>
-          <p:cNvSpPr txBox="1"/>
-          <p:nvPr/>
-        </p:nvSpPr>
-        <p:spPr>
-          <a:xfrm>
-            <a:off x="5299656" y="2937367"/>
-            <a:ext cx="1748790" cy="369332"/>
-          </a:xfrm>
-          <a:prstGeom prst="rect">
-            <a:avLst/>
-          </a:prstGeom>
-          <a:noFill/>
-        </p:spPr>
-        <p:txBody>
-          <a:bodyPr wrap="square" rtlCol="0">
-            <a:spAutoFit/>
-          </a:bodyPr>
-          <a:lstStyle/>
-          <a:p>
-            <a:pPr algn="ctr"/>
-            <a:r>
-              <a:rPr lang="en-US" dirty="0" smtClean="0"/>
-              <a:t>Username</a:t>
-            </a:r>
-            <a:endParaRPr lang="en-US" dirty="0"/>
-          </a:p>
-        </p:txBody>
-      </p:sp>
-      <p:sp>
-        <p:nvSpPr>
-          <p:cNvPr id="18" name="TextBox 17"/>
-          <p:cNvSpPr txBox="1"/>
-          <p:nvPr/>
-        </p:nvSpPr>
-        <p:spPr>
-          <a:xfrm>
-            <a:off x="5337810" y="3536156"/>
-            <a:ext cx="1748790" cy="369332"/>
-          </a:xfrm>
-          <a:prstGeom prst="rect">
-            <a:avLst/>
-          </a:prstGeom>
-          <a:noFill/>
-        </p:spPr>
-        <p:txBody>
-          <a:bodyPr wrap="square" rtlCol="0">
-            <a:spAutoFit/>
-          </a:bodyPr>
-          <a:lstStyle/>
-          <a:p>
-            <a:pPr algn="ctr"/>
-            <a:r>
-              <a:rPr lang="en-US" dirty="0" smtClean="0"/>
-              <a:t>Password</a:t>
-            </a:r>
-          </a:p>
-        </p:txBody>
-      </p:sp>
-      <p:sp>
-        <p:nvSpPr>
-          <p:cNvPr id="19" name="TextBox 18"/>
-          <p:cNvSpPr txBox="1"/>
-          <p:nvPr/>
-        </p:nvSpPr>
-        <p:spPr>
-          <a:xfrm>
-            <a:off x="5261502" y="4646587"/>
-            <a:ext cx="1812525" cy="369332"/>
-          </a:xfrm>
-          <a:prstGeom prst="rect">
-            <a:avLst/>
-          </a:prstGeom>
-          <a:noFill/>
-        </p:spPr>
-        <p:txBody>
-          <a:bodyPr wrap="square" rtlCol="0">
-            <a:spAutoFit/>
-          </a:bodyPr>
-          <a:lstStyle/>
-          <a:p>
-            <a:pPr algn="ctr"/>
-            <a:r>
-              <a:rPr lang="en-US" smtClean="0"/>
-              <a:t>Forgot Password</a:t>
-            </a:r>
-            <a:endParaRPr lang="en-US" dirty="0"/>
-          </a:p>
-        </p:txBody>
-      </p:sp>
-      <p:sp>
-        <p:nvSpPr>
-          <p:cNvPr id="20" name="TextBox 19"/>
-          <p:cNvSpPr txBox="1"/>
-          <p:nvPr/>
-        </p:nvSpPr>
-        <p:spPr>
-          <a:xfrm>
-            <a:off x="4355239" y="5403550"/>
-            <a:ext cx="1812525" cy="369332"/>
-          </a:xfrm>
-          <a:prstGeom prst="rect">
-            <a:avLst/>
-          </a:prstGeom>
-          <a:noFill/>
-        </p:spPr>
-        <p:txBody>
-          <a:bodyPr wrap="square" rtlCol="0">
-            <a:spAutoFit/>
-          </a:bodyPr>
-          <a:lstStyle/>
-          <a:p>
-            <a:pPr algn="ctr"/>
-            <a:r>
-              <a:rPr lang="en-US" dirty="0" smtClean="0"/>
-              <a:t>Facebook</a:t>
-            </a:r>
-          </a:p>
-        </p:txBody>
-      </p:sp>
-      <p:sp>
-        <p:nvSpPr>
-          <p:cNvPr id="21" name="Rounded Rectangle 20"/>
-          <p:cNvSpPr/>
-          <p:nvPr/>
-        </p:nvSpPr>
-        <p:spPr>
-          <a:xfrm>
-            <a:off x="6333090" y="5318903"/>
-            <a:ext cx="1445895" cy="556546"/>
-          </a:xfrm>
-          <a:prstGeom prst="roundRect">
-            <a:avLst/>
-          </a:prstGeom>
-        </p:spPr>
-        <p:style>
-          <a:lnRef idx="2">
-            <a:schemeClr val="accent1">
-              <a:shade val="50000"/>
-            </a:schemeClr>
-          </a:lnRef>
-          <a:fillRef idx="1">
-            <a:schemeClr val="accent1"/>
-          </a:fillRef>
-          <a:effectRef idx="0">
-            <a:schemeClr val="accent1"/>
-          </a:effectRef>
-          <a:fontRef idx="minor">
-            <a:schemeClr val="lt1"/>
-          </a:fontRef>
-        </p:style>
-        <p:txBody>
-          <a:bodyPr rtlCol="0" anchor="ctr"/>
-          <a:lstStyle/>
-          <a:p>
-            <a:pPr algn="ctr"/>
-            <a:endParaRPr lang="en-US"/>
-          </a:p>
-        </p:txBody>
-      </p:sp>
-      <p:sp>
-        <p:nvSpPr>
-          <p:cNvPr id="22" name="TextBox 21"/>
-          <p:cNvSpPr txBox="1"/>
-          <p:nvPr/>
-        </p:nvSpPr>
-        <p:spPr>
-          <a:xfrm>
-            <a:off x="6180337" y="5412510"/>
-            <a:ext cx="1812525" cy="369332"/>
-          </a:xfrm>
-          <a:prstGeom prst="rect">
-            <a:avLst/>
-          </a:prstGeom>
-          <a:noFill/>
-        </p:spPr>
-        <p:txBody>
-          <a:bodyPr wrap="square" rtlCol="0">
-            <a:spAutoFit/>
-          </a:bodyPr>
-          <a:lstStyle/>
-          <a:p>
-            <a:pPr algn="ctr"/>
-            <a:r>
-              <a:rPr lang="en-US" dirty="0" smtClean="0"/>
-              <a:t>Google</a:t>
-            </a:r>
-          </a:p>
-        </p:txBody>
-      </p:sp>
-      <p:sp>
-        <p:nvSpPr>
-          <p:cNvPr id="24" name="TextBox 23"/>
-          <p:cNvSpPr txBox="1"/>
-          <p:nvPr/>
-        </p:nvSpPr>
-        <p:spPr>
-          <a:xfrm>
-            <a:off x="331470" y="502920"/>
-            <a:ext cx="2023110" cy="369332"/>
-          </a:xfrm>
-          <a:prstGeom prst="rect">
-            <a:avLst/>
-          </a:prstGeom>
-          <a:noFill/>
-        </p:spPr>
-        <p:txBody>
-          <a:bodyPr wrap="square" rtlCol="0">
-            <a:spAutoFit/>
-          </a:bodyPr>
-          <a:lstStyle/>
-          <a:p>
-            <a:r>
-              <a:rPr lang="en-US" dirty="0" smtClean="0"/>
-              <a:t>Login</a:t>
-            </a:r>
-            <a:endParaRPr lang="en-US" dirty="0"/>
+              <a:rPr lang="en-US" dirty="0" smtClean="0">
+                <a:solidFill>
+                  <a:schemeClr val="bg1">
+                    <a:lumMod val="75000"/>
+                  </a:schemeClr>
+                </a:solidFill>
+                <a:effectLst>
+                  <a:outerShdw blurRad="50800" dist="177800" dir="4080000" sx="105000" sy="105000" algn="ctr" rotWithShape="0">
+                    <a:srgbClr val="000000">
+                      <a:alpha val="43137"/>
+                    </a:srgbClr>
+                  </a:outerShdw>
+                </a:effectLst>
+              </a:rPr>
+              <a:t>Cancel</a:t>
+            </a:r>
           </a:p>
         </p:txBody>
       </p:sp>
     </p:spTree>
     <p:extLst>
       <p:ext uri="{BB962C8B-B14F-4D97-AF65-F5344CB8AC3E}">
-        <p14:creationId xmlns:p14="http://schemas.microsoft.com/office/powerpoint/2010/main" val="482659821"/>
+        <p14:creationId xmlns:p14="http://schemas.microsoft.com/office/powerpoint/2010/main" val="1110992321"/>
       </p:ext>
     </p:extLst>
   </p:cSld>
@@ -5162,23 +5925,50 @@
           <a:chExt cx="0" cy="0"/>
         </a:xfrm>
       </p:grpSpPr>
-      <p:sp>
-        <p:nvSpPr>
-          <p:cNvPr id="4" name="Rounded Rectangle 3"/>
+      <p:pic>
+        <p:nvPicPr>
+          <p:cNvPr id="4" name="Picture 3"/>
+          <p:cNvPicPr>
+            <a:picLocks noChangeAspect="1"/>
+          </p:cNvPicPr>
+          <p:nvPr/>
+        </p:nvPicPr>
+        <p:blipFill>
+          <a:blip r:embed="rId3">
+            <a:extLst>
+              <a:ext uri="{28A0092B-C50C-407E-A947-70E740481C1C}">
+                <a14:useLocalDpi xmlns:a14="http://schemas.microsoft.com/office/drawing/2010/main" val="0"/>
+              </a:ext>
+            </a:extLst>
+          </a:blip>
+          <a:stretch>
+            <a:fillRect/>
+          </a:stretch>
+        </p:blipFill>
+        <p:spPr>
+          <a:xfrm>
+            <a:off x="3945890" y="0"/>
+            <a:ext cx="3440545" cy="6858000"/>
+          </a:xfrm>
+          <a:prstGeom prst="rect">
+            <a:avLst/>
+          </a:prstGeom>
+        </p:spPr>
+      </p:pic>
+      <p:sp>
+        <p:nvSpPr>
+          <p:cNvPr id="6" name="Rectangle 5"/>
           <p:cNvSpPr/>
           <p:nvPr/>
         </p:nvSpPr>
         <p:spPr>
           <a:xfrm>
-            <a:off x="4116651" y="234077"/>
-            <a:ext cx="4114800" cy="6318504"/>
-          </a:xfrm>
-          <a:prstGeom prst="roundRect">
-            <a:avLst/>
-          </a:prstGeom>
-          <a:solidFill>
-            <a:schemeClr val="bg1"/>
-          </a:solidFill>
+            <a:off x="4108436" y="777240"/>
+            <a:ext cx="3108960" cy="4949190"/>
+          </a:xfrm>
+          <a:prstGeom prst="rect">
+            <a:avLst/>
+          </a:prstGeom>
         </p:spPr>
         <p:style>
           <a:lnRef idx="2">
@@ -5186,8 +5976,8 @@
               <a:shade val="50000"/>
             </a:schemeClr>
           </a:lnRef>
-          <a:fillRef idx="1">
-            <a:schemeClr val="accent1"/>
+          <a:fillRef idx="1003">
+            <a:schemeClr val="dk2"/>
           </a:fillRef>
           <a:effectRef idx="0">
             <a:schemeClr val="accent1"/>
@@ -5201,180 +5991,186 @@
           <a:lstStyle/>
           <a:p>
             <a:pPr algn="ctr"/>
-            <a:endParaRPr lang="en-US"/>
-          </a:p>
-        </p:txBody>
-      </p:sp>
-      <p:sp>
-        <p:nvSpPr>
-          <p:cNvPr id="5" name="Rounded Rectangle 4"/>
-          <p:cNvSpPr/>
-          <p:nvPr/>
-        </p:nvSpPr>
-        <p:spPr>
-          <a:xfrm>
-            <a:off x="4979616" y="1931486"/>
-            <a:ext cx="2343150" cy="411480"/>
-          </a:xfrm>
-          <a:prstGeom prst="roundRect">
-            <a:avLst/>
-          </a:prstGeom>
-        </p:spPr>
-        <p:style>
-          <a:lnRef idx="2">
-            <a:schemeClr val="accent1">
-              <a:shade val="50000"/>
-            </a:schemeClr>
-          </a:lnRef>
-          <a:fillRef idx="1">
-            <a:schemeClr val="accent1"/>
-          </a:fillRef>
-          <a:effectRef idx="0">
-            <a:schemeClr val="accent1"/>
-          </a:effectRef>
-          <a:fontRef idx="minor">
-            <a:schemeClr val="lt1"/>
-          </a:fontRef>
-        </p:style>
-        <p:txBody>
-          <a:bodyPr rtlCol="0" anchor="ctr"/>
-          <a:lstStyle/>
-          <a:p>
-            <a:pPr algn="ctr"/>
-            <a:endParaRPr lang="en-US"/>
-          </a:p>
-        </p:txBody>
-      </p:sp>
-      <p:sp>
-        <p:nvSpPr>
-          <p:cNvPr id="6" name="Rounded Rectangle 5"/>
-          <p:cNvSpPr/>
-          <p:nvPr/>
-        </p:nvSpPr>
-        <p:spPr>
-          <a:xfrm>
-            <a:off x="4979616" y="2505242"/>
-            <a:ext cx="2343150" cy="411480"/>
-          </a:xfrm>
-          <a:prstGeom prst="roundRect">
-            <a:avLst/>
-          </a:prstGeom>
-        </p:spPr>
-        <p:style>
-          <a:lnRef idx="2">
-            <a:schemeClr val="accent1">
-              <a:shade val="50000"/>
-            </a:schemeClr>
-          </a:lnRef>
-          <a:fillRef idx="1">
-            <a:schemeClr val="accent1"/>
-          </a:fillRef>
-          <a:effectRef idx="0">
-            <a:schemeClr val="accent1"/>
-          </a:effectRef>
-          <a:fontRef idx="minor">
-            <a:schemeClr val="lt1"/>
-          </a:fontRef>
-        </p:style>
-        <p:txBody>
-          <a:bodyPr rtlCol="0" anchor="ctr"/>
-          <a:lstStyle/>
-          <a:p>
-            <a:pPr algn="ctr"/>
-            <a:endParaRPr lang="en-US"/>
-          </a:p>
-        </p:txBody>
-      </p:sp>
-      <p:sp>
-        <p:nvSpPr>
-          <p:cNvPr id="7" name="Rounded Rectangle 6"/>
-          <p:cNvSpPr/>
-          <p:nvPr/>
-        </p:nvSpPr>
-        <p:spPr>
-          <a:xfrm>
-            <a:off x="4981031" y="3063551"/>
-            <a:ext cx="2343150" cy="411480"/>
-          </a:xfrm>
-          <a:prstGeom prst="roundRect">
-            <a:avLst/>
-          </a:prstGeom>
-        </p:spPr>
-        <p:style>
-          <a:lnRef idx="2">
-            <a:schemeClr val="accent1">
-              <a:shade val="50000"/>
-            </a:schemeClr>
-          </a:lnRef>
-          <a:fillRef idx="1">
-            <a:schemeClr val="accent1"/>
-          </a:fillRef>
-          <a:effectRef idx="0">
-            <a:schemeClr val="accent1"/>
-          </a:effectRef>
-          <a:fontRef idx="minor">
-            <a:schemeClr val="lt1"/>
-          </a:fontRef>
-        </p:style>
-        <p:txBody>
-          <a:bodyPr rtlCol="0" anchor="ctr"/>
-          <a:lstStyle/>
-          <a:p>
-            <a:pPr algn="ctr"/>
-            <a:endParaRPr lang="en-US"/>
-          </a:p>
-        </p:txBody>
-      </p:sp>
-      <p:sp>
-        <p:nvSpPr>
-          <p:cNvPr id="8" name="Rounded Rectangle 7"/>
-          <p:cNvSpPr/>
-          <p:nvPr/>
-        </p:nvSpPr>
-        <p:spPr>
-          <a:xfrm>
-            <a:off x="5017770" y="3665185"/>
-            <a:ext cx="2343150" cy="411480"/>
-          </a:xfrm>
-          <a:prstGeom prst="roundRect">
-            <a:avLst/>
-          </a:prstGeom>
-        </p:spPr>
-        <p:style>
-          <a:lnRef idx="2">
-            <a:schemeClr val="accent1">
-              <a:shade val="50000"/>
-            </a:schemeClr>
-          </a:lnRef>
-          <a:fillRef idx="1">
-            <a:schemeClr val="accent1"/>
-          </a:fillRef>
-          <a:effectRef idx="0">
-            <a:schemeClr val="accent1"/>
-          </a:effectRef>
-          <a:fontRef idx="minor">
-            <a:schemeClr val="lt1"/>
-          </a:fontRef>
-        </p:style>
-        <p:txBody>
-          <a:bodyPr rtlCol="0" anchor="ctr"/>
-          <a:lstStyle/>
-          <a:p>
-            <a:pPr algn="ctr"/>
-            <a:endParaRPr lang="en-US"/>
-          </a:p>
-        </p:txBody>
-      </p:sp>
-      <p:sp>
-        <p:nvSpPr>
-          <p:cNvPr id="9" name="TextBox 8"/>
+            <a:endParaRPr lang="en-US" dirty="0" smtClean="0">
+              <a:solidFill>
+                <a:schemeClr val="bg1">
+                  <a:lumMod val="75000"/>
+                </a:schemeClr>
+              </a:solidFill>
+              <a:effectLst>
+                <a:outerShdw blurRad="50800" dist="177800" dir="4080000" algn="ctr" rotWithShape="0">
+                  <a:srgbClr val="000000">
+                    <a:alpha val="43137"/>
+                  </a:srgbClr>
+                </a:outerShdw>
+              </a:effectLst>
+            </a:endParaRPr>
+          </a:p>
+          <a:p>
+            <a:pPr algn="ctr"/>
+            <a:endParaRPr lang="en-US" dirty="0" smtClean="0">
+              <a:solidFill>
+                <a:schemeClr val="bg1">
+                  <a:lumMod val="75000"/>
+                </a:schemeClr>
+              </a:solidFill>
+              <a:effectLst>
+                <a:outerShdw blurRad="50800" dist="177800" dir="4080000" algn="ctr" rotWithShape="0">
+                  <a:srgbClr val="000000">
+                    <a:alpha val="43137"/>
+                  </a:srgbClr>
+                </a:outerShdw>
+              </a:effectLst>
+            </a:endParaRPr>
+          </a:p>
+          <a:p>
+            <a:pPr algn="ctr"/>
+            <a:endParaRPr lang="en-US" dirty="0" smtClean="0">
+              <a:solidFill>
+                <a:schemeClr val="bg1">
+                  <a:lumMod val="75000"/>
+                </a:schemeClr>
+              </a:solidFill>
+              <a:effectLst>
+                <a:outerShdw blurRad="50800" dist="177800" dir="4080000" algn="ctr" rotWithShape="0">
+                  <a:srgbClr val="000000">
+                    <a:alpha val="43137"/>
+                  </a:srgbClr>
+                </a:outerShdw>
+              </a:effectLst>
+            </a:endParaRPr>
+          </a:p>
+          <a:p>
+            <a:pPr algn="ctr"/>
+            <a:endParaRPr lang="en-US" dirty="0" smtClean="0">
+              <a:solidFill>
+                <a:schemeClr val="bg1">
+                  <a:lumMod val="75000"/>
+                </a:schemeClr>
+              </a:solidFill>
+              <a:effectLst>
+                <a:outerShdw blurRad="50800" dist="177800" dir="4080000" algn="ctr" rotWithShape="0">
+                  <a:srgbClr val="000000">
+                    <a:alpha val="43137"/>
+                  </a:srgbClr>
+                </a:outerShdw>
+              </a:effectLst>
+            </a:endParaRPr>
+          </a:p>
+          <a:p>
+            <a:pPr algn="ctr"/>
+            <a:endParaRPr lang="en-US" dirty="0" smtClean="0">
+              <a:solidFill>
+                <a:schemeClr val="bg1">
+                  <a:lumMod val="75000"/>
+                </a:schemeClr>
+              </a:solidFill>
+              <a:effectLst>
+                <a:outerShdw blurRad="50800" dist="177800" dir="4080000" algn="ctr" rotWithShape="0">
+                  <a:srgbClr val="000000">
+                    <a:alpha val="43137"/>
+                  </a:srgbClr>
+                </a:outerShdw>
+              </a:effectLst>
+            </a:endParaRPr>
+          </a:p>
+          <a:p>
+            <a:pPr algn="ctr"/>
+            <a:endParaRPr lang="en-US" dirty="0" smtClean="0">
+              <a:solidFill>
+                <a:schemeClr val="bg1">
+                  <a:lumMod val="75000"/>
+                </a:schemeClr>
+              </a:solidFill>
+              <a:effectLst>
+                <a:outerShdw blurRad="50800" dist="177800" dir="4080000" algn="ctr" rotWithShape="0">
+                  <a:srgbClr val="000000">
+                    <a:alpha val="43137"/>
+                  </a:srgbClr>
+                </a:outerShdw>
+              </a:effectLst>
+            </a:endParaRPr>
+          </a:p>
+          <a:p>
+            <a:pPr algn="ctr"/>
+            <a:endParaRPr lang="en-US" dirty="0" smtClean="0">
+              <a:solidFill>
+                <a:schemeClr val="bg1">
+                  <a:lumMod val="75000"/>
+                </a:schemeClr>
+              </a:solidFill>
+              <a:effectLst>
+                <a:outerShdw blurRad="50800" dist="177800" dir="4080000" algn="ctr" rotWithShape="0">
+                  <a:srgbClr val="000000">
+                    <a:alpha val="43137"/>
+                  </a:srgbClr>
+                </a:outerShdw>
+              </a:effectLst>
+            </a:endParaRPr>
+          </a:p>
+          <a:p>
+            <a:pPr algn="ctr"/>
+            <a:endParaRPr lang="en-US" dirty="0" smtClean="0">
+              <a:solidFill>
+                <a:schemeClr val="bg1">
+                  <a:lumMod val="75000"/>
+                </a:schemeClr>
+              </a:solidFill>
+              <a:effectLst>
+                <a:outerShdw blurRad="50800" dist="177800" dir="4080000" algn="ctr" rotWithShape="0">
+                  <a:srgbClr val="000000">
+                    <a:alpha val="43137"/>
+                  </a:srgbClr>
+                </a:outerShdw>
+              </a:effectLst>
+            </a:endParaRPr>
+          </a:p>
+          <a:p>
+            <a:pPr algn="ctr"/>
+            <a:endParaRPr lang="en-US" dirty="0" smtClean="0">
+              <a:solidFill>
+                <a:schemeClr val="bg1">
+                  <a:lumMod val="75000"/>
+                </a:schemeClr>
+              </a:solidFill>
+              <a:effectLst>
+                <a:outerShdw blurRad="50800" dist="177800" dir="4080000" algn="ctr" rotWithShape="0">
+                  <a:srgbClr val="000000">
+                    <a:alpha val="43137"/>
+                  </a:srgbClr>
+                </a:outerShdw>
+              </a:effectLst>
+            </a:endParaRPr>
+          </a:p>
+          <a:p>
+            <a:pPr algn="ctr"/>
+            <a:endParaRPr lang="en-US" dirty="0" smtClean="0">
+              <a:solidFill>
+                <a:schemeClr val="bg1">
+                  <a:lumMod val="75000"/>
+                </a:schemeClr>
+              </a:solidFill>
+              <a:effectLst>
+                <a:outerShdw blurRad="50800" dist="177800" dir="4080000" algn="ctr" rotWithShape="0">
+                  <a:srgbClr val="000000">
+                    <a:alpha val="43137"/>
+                  </a:srgbClr>
+                </a:outerShdw>
+              </a:effectLst>
+            </a:endParaRPr>
+          </a:p>
+        </p:txBody>
+      </p:sp>
+      <p:sp>
+        <p:nvSpPr>
+          <p:cNvPr id="7" name="TextBox 6"/>
           <p:cNvSpPr txBox="1"/>
           <p:nvPr/>
         </p:nvSpPr>
         <p:spPr>
           <a:xfrm>
-            <a:off x="5276796" y="1952560"/>
-            <a:ext cx="1748790" cy="369332"/>
+            <a:off x="331470" y="502920"/>
+            <a:ext cx="2251710" cy="1569660"/>
           </a:xfrm>
           <a:prstGeom prst="rect">
             <a:avLst/>
@@ -5389,23 +6185,98 @@
           <a:p>
             <a:pPr algn="ctr"/>
             <a:r>
-              <a:rPr lang="en-US" dirty="0" smtClean="0"/>
-              <a:t>Name</a:t>
-            </a:r>
-            <a:endParaRPr lang="en-US" dirty="0"/>
-          </a:p>
-        </p:txBody>
-      </p:sp>
-      <p:sp>
-        <p:nvSpPr>
-          <p:cNvPr id="10" name="TextBox 9"/>
+              <a:rPr lang="en-US" sz="3200" u="sng" dirty="0" smtClean="0">
+                <a:latin typeface="Arial" charset="0"/>
+                <a:ea typeface="Arial" charset="0"/>
+                <a:cs typeface="Arial" charset="0"/>
+              </a:rPr>
+              <a:t>Reset</a:t>
+            </a:r>
+          </a:p>
+          <a:p>
+            <a:pPr algn="ctr"/>
+            <a:r>
+              <a:rPr lang="en-US" sz="3200" u="sng" dirty="0" smtClean="0">
+                <a:latin typeface="Arial" charset="0"/>
+                <a:ea typeface="Arial" charset="0"/>
+                <a:cs typeface="Arial" charset="0"/>
+              </a:rPr>
+              <a:t>Password</a:t>
+            </a:r>
+          </a:p>
+          <a:p>
+            <a:pPr algn="ctr"/>
+            <a:r>
+              <a:rPr lang="en-US" sz="3200" u="sng" dirty="0" smtClean="0">
+                <a:latin typeface="Arial" charset="0"/>
+                <a:ea typeface="Arial" charset="0"/>
+                <a:cs typeface="Arial" charset="0"/>
+              </a:rPr>
+              <a:t>Page</a:t>
+            </a:r>
+            <a:endParaRPr lang="en-US" sz="3200" u="sng" dirty="0">
+              <a:latin typeface="Arial" charset="0"/>
+              <a:ea typeface="Arial" charset="0"/>
+              <a:cs typeface="Arial" charset="0"/>
+            </a:endParaRPr>
+          </a:p>
+        </p:txBody>
+      </p:sp>
+      <p:sp>
+        <p:nvSpPr>
+          <p:cNvPr id="8" name="Rounded Rectangle 7"/>
+          <p:cNvSpPr/>
+          <p:nvPr/>
+        </p:nvSpPr>
+        <p:spPr>
+          <a:xfrm>
+            <a:off x="4194160" y="3251835"/>
+            <a:ext cx="2937510" cy="457200"/>
+          </a:xfrm>
+          <a:prstGeom prst="roundRect">
+            <a:avLst/>
+          </a:prstGeom>
+          <a:effectLst>
+            <a:outerShdw blurRad="50800" dist="25400" dir="2880000" algn="ctr" rotWithShape="0">
+              <a:srgbClr val="000000">
+                <a:alpha val="43137"/>
+              </a:srgbClr>
+            </a:outerShdw>
+          </a:effectLst>
+        </p:spPr>
+        <p:style>
+          <a:lnRef idx="1">
+            <a:schemeClr val="dk1"/>
+          </a:lnRef>
+          <a:fillRef idx="1003">
+            <a:schemeClr val="lt2"/>
+          </a:fillRef>
+          <a:effectRef idx="1">
+            <a:schemeClr val="dk1"/>
+          </a:effectRef>
+          <a:fontRef idx="minor">
+            <a:schemeClr val="dk1"/>
+          </a:fontRef>
+        </p:style>
+        <p:txBody>
+          <a:bodyPr rtlCol="0" anchor="ctr"/>
+          <a:lstStyle/>
+          <a:p>
+            <a:pPr algn="ctr"/>
+            <a:endParaRPr lang="en-US" dirty="0" smtClean="0"/>
+          </a:p>
+        </p:txBody>
+      </p:sp>
+      <p:sp>
+        <p:nvSpPr>
+          <p:cNvPr id="9" name="TextBox 8"/>
           <p:cNvSpPr txBox="1"/>
           <p:nvPr/>
         </p:nvSpPr>
         <p:spPr>
           <a:xfrm>
-            <a:off x="5166360" y="3686259"/>
-            <a:ext cx="2045970" cy="369332"/>
+            <a:off x="3839830" y="2974836"/>
+            <a:ext cx="3646170" cy="276999"/>
           </a:xfrm>
           <a:prstGeom prst="rect">
             <a:avLst/>
@@ -5420,23 +6291,26 @@
           <a:p>
             <a:pPr algn="ctr"/>
             <a:r>
-              <a:rPr lang="en-US" dirty="0" smtClean="0"/>
-              <a:t>Confirm Password</a:t>
-            </a:r>
-            <a:endParaRPr lang="en-US" dirty="0"/>
-          </a:p>
-        </p:txBody>
-      </p:sp>
-      <p:sp>
-        <p:nvSpPr>
-          <p:cNvPr id="11" name="TextBox 10"/>
+              <a:rPr lang="en-US" sz="1200" dirty="0" smtClean="0">
+                <a:solidFill>
+                  <a:schemeClr val="bg1"/>
+                </a:solidFill>
+              </a:rPr>
+              <a:t>*Enter Email Phone Number Or Username</a:t>
+            </a:r>
+          </a:p>
+        </p:txBody>
+      </p:sp>
+      <p:sp>
+        <p:nvSpPr>
+          <p:cNvPr id="10" name="TextBox 9"/>
           <p:cNvSpPr txBox="1"/>
           <p:nvPr/>
         </p:nvSpPr>
         <p:spPr>
           <a:xfrm>
-            <a:off x="5278211" y="3042608"/>
-            <a:ext cx="1748790" cy="369332"/>
+            <a:off x="4587940" y="2359134"/>
+            <a:ext cx="2149948" cy="461665"/>
           </a:xfrm>
           <a:prstGeom prst="rect">
             <a:avLst/>
@@ -5444,399 +6318,207 @@
           <a:noFill/>
         </p:spPr>
         <p:txBody>
-          <a:bodyPr wrap="square" rtlCol="0">
+          <a:bodyPr wrap="none" rtlCol="0">
             <a:spAutoFit/>
           </a:bodyPr>
           <a:lstStyle/>
           <a:p>
             <a:pPr algn="ctr"/>
             <a:r>
-              <a:rPr lang="en-US" dirty="0" smtClean="0"/>
-              <a:t>Password</a:t>
-            </a:r>
-            <a:endParaRPr lang="en-US" dirty="0"/>
-          </a:p>
-        </p:txBody>
-      </p:sp>
-      <p:sp>
-        <p:nvSpPr>
-          <p:cNvPr id="12" name="TextBox 11"/>
-          <p:cNvSpPr txBox="1"/>
-          <p:nvPr/>
-        </p:nvSpPr>
-        <p:spPr>
-          <a:xfrm>
-            <a:off x="5276796" y="2526316"/>
-            <a:ext cx="1748790" cy="369332"/>
+              <a:rPr lang="en-US" sz="2400" dirty="0" smtClean="0">
+                <a:solidFill>
+                  <a:schemeClr val="bg1"/>
+                </a:solidFill>
+                <a:effectLst>
+                  <a:outerShdw blurRad="50800" dist="266700" dir="1980000" algn="ctr" rotWithShape="0">
+                    <a:srgbClr val="000000">
+                      <a:alpha val="43137"/>
+                    </a:srgbClr>
+                  </a:outerShdw>
+                </a:effectLst>
+                <a:latin typeface="Apple Chancery" charset="0"/>
+                <a:ea typeface="Apple Chancery" charset="0"/>
+                <a:cs typeface="Apple Chancery" charset="0"/>
+              </a:rPr>
+              <a:t>Password Reset</a:t>
+            </a:r>
+            <a:endParaRPr lang="en-US" sz="2400" dirty="0">
+              <a:solidFill>
+                <a:schemeClr val="bg1"/>
+              </a:solidFill>
+              <a:effectLst>
+                <a:outerShdw blurRad="50800" dist="266700" dir="1980000" algn="ctr" rotWithShape="0">
+                  <a:srgbClr val="000000">
+                    <a:alpha val="43137"/>
+                  </a:srgbClr>
+                </a:outerShdw>
+              </a:effectLst>
+              <a:latin typeface="Apple Chancery" charset="0"/>
+              <a:ea typeface="Apple Chancery" charset="0"/>
+              <a:cs typeface="Apple Chancery" charset="0"/>
+            </a:endParaRPr>
+          </a:p>
+        </p:txBody>
+      </p:sp>
+      <p:sp>
+        <p:nvSpPr>
+          <p:cNvPr id="11" name="Rectangle 10"/>
+          <p:cNvSpPr/>
+          <p:nvPr/>
+        </p:nvSpPr>
+        <p:spPr>
+          <a:xfrm>
+            <a:off x="5238760" y="4075866"/>
+            <a:ext cx="848309" cy="369332"/>
           </a:xfrm>
           <a:prstGeom prst="rect">
             <a:avLst/>
           </a:prstGeom>
-          <a:noFill/>
-        </p:spPr>
-        <p:txBody>
-          <a:bodyPr wrap="square" rtlCol="0">
+        </p:spPr>
+        <p:txBody>
+          <a:bodyPr wrap="none">
             <a:spAutoFit/>
           </a:bodyPr>
           <a:lstStyle/>
           <a:p>
             <a:pPr algn="ctr"/>
             <a:r>
-              <a:rPr lang="en-US" dirty="0" smtClean="0"/>
-              <a:t>Username</a:t>
-            </a:r>
-            <a:endParaRPr lang="en-US" dirty="0"/>
-          </a:p>
-        </p:txBody>
-      </p:sp>
-      <p:sp>
-        <p:nvSpPr>
-          <p:cNvPr id="16" name="Rounded Rectangle 15"/>
+              <a:rPr lang="en-US" smtClean="0">
+                <a:solidFill>
+                  <a:schemeClr val="bg1">
+                    <a:lumMod val="75000"/>
+                  </a:schemeClr>
+                </a:solidFill>
+                <a:effectLst>
+                  <a:outerShdw blurRad="50800" dist="177800" dir="4080000" sx="105000" sy="105000" algn="ctr" rotWithShape="0">
+                    <a:srgbClr val="000000">
+                      <a:alpha val="43137"/>
+                    </a:srgbClr>
+                  </a:outerShdw>
+                </a:effectLst>
+              </a:rPr>
+              <a:t>Submit</a:t>
+            </a:r>
+            <a:endParaRPr lang="en-US" dirty="0" smtClean="0">
+              <a:solidFill>
+                <a:schemeClr val="bg1">
+                  <a:lumMod val="75000"/>
+                </a:schemeClr>
+              </a:solidFill>
+              <a:effectLst>
+                <a:outerShdw blurRad="50800" dist="177800" dir="4080000" sx="105000" sy="105000" algn="ctr" rotWithShape="0">
+                  <a:srgbClr val="000000">
+                    <a:alpha val="43137"/>
+                  </a:srgbClr>
+                </a:outerShdw>
+              </a:effectLst>
+            </a:endParaRPr>
+          </a:p>
+        </p:txBody>
+      </p:sp>
+      <p:sp>
+        <p:nvSpPr>
+          <p:cNvPr id="12" name="Rectangle 11"/>
           <p:cNvSpPr/>
           <p:nvPr/>
         </p:nvSpPr>
         <p:spPr>
           <a:xfrm>
-            <a:off x="5017770" y="4261187"/>
-            <a:ext cx="2343150" cy="411480"/>
-          </a:xfrm>
-          <a:prstGeom prst="roundRect">
-            <a:avLst/>
-          </a:prstGeom>
-        </p:spPr>
-        <p:style>
-          <a:lnRef idx="2">
-            <a:schemeClr val="accent1">
-              <a:shade val="50000"/>
-            </a:schemeClr>
-          </a:lnRef>
-          <a:fillRef idx="1">
-            <a:schemeClr val="accent1"/>
-          </a:fillRef>
-          <a:effectRef idx="0">
-            <a:schemeClr val="accent1"/>
-          </a:effectRef>
-          <a:fontRef idx="minor">
-            <a:schemeClr val="lt1"/>
-          </a:fontRef>
-        </p:style>
-        <p:txBody>
-          <a:bodyPr rtlCol="0" anchor="ctr"/>
-          <a:lstStyle/>
-          <a:p>
-            <a:pPr algn="ctr"/>
-            <a:endParaRPr lang="en-US"/>
-          </a:p>
-        </p:txBody>
-      </p:sp>
-      <p:sp>
-        <p:nvSpPr>
-          <p:cNvPr id="17" name="TextBox 16"/>
-          <p:cNvSpPr txBox="1"/>
-          <p:nvPr/>
-        </p:nvSpPr>
-        <p:spPr>
-          <a:xfrm>
-            <a:off x="5166360" y="4282261"/>
-            <a:ext cx="2045970" cy="369332"/>
+            <a:off x="5259600" y="4501009"/>
+            <a:ext cx="806631" cy="369332"/>
           </a:xfrm>
           <a:prstGeom prst="rect">
             <a:avLst/>
           </a:prstGeom>
-          <a:noFill/>
-        </p:spPr>
-        <p:txBody>
-          <a:bodyPr wrap="square" rtlCol="0">
+        </p:spPr>
+        <p:txBody>
+          <a:bodyPr wrap="none">
             <a:spAutoFit/>
           </a:bodyPr>
           <a:lstStyle/>
           <a:p>
             <a:pPr algn="ctr"/>
             <a:r>
-              <a:rPr lang="en-US" dirty="0" smtClean="0"/>
-              <a:t>Email</a:t>
-            </a:r>
-            <a:endParaRPr lang="en-US" dirty="0"/>
-          </a:p>
-        </p:txBody>
-      </p:sp>
-      <p:sp>
-        <p:nvSpPr>
-          <p:cNvPr id="18" name="Rounded Rectangle 17"/>
-          <p:cNvSpPr/>
-          <p:nvPr/>
-        </p:nvSpPr>
-        <p:spPr>
-          <a:xfrm>
-            <a:off x="5017770" y="4879302"/>
-            <a:ext cx="2343150" cy="411480"/>
-          </a:xfrm>
-          <a:prstGeom prst="roundRect">
-            <a:avLst/>
-          </a:prstGeom>
-        </p:spPr>
-        <p:style>
-          <a:lnRef idx="2">
-            <a:schemeClr val="accent1">
-              <a:shade val="50000"/>
-            </a:schemeClr>
-          </a:lnRef>
-          <a:fillRef idx="1">
-            <a:schemeClr val="accent1"/>
-          </a:fillRef>
-          <a:effectRef idx="0">
-            <a:schemeClr val="accent1"/>
-          </a:effectRef>
-          <a:fontRef idx="minor">
-            <a:schemeClr val="lt1"/>
-          </a:fontRef>
-        </p:style>
-        <p:txBody>
-          <a:bodyPr rtlCol="0" anchor="ctr"/>
-          <a:lstStyle/>
-          <a:p>
-            <a:pPr algn="ctr"/>
-            <a:endParaRPr lang="en-US"/>
-          </a:p>
-        </p:txBody>
-      </p:sp>
-      <p:sp>
-        <p:nvSpPr>
-          <p:cNvPr id="19" name="TextBox 18"/>
-          <p:cNvSpPr txBox="1"/>
-          <p:nvPr/>
-        </p:nvSpPr>
-        <p:spPr>
-          <a:xfrm>
-            <a:off x="5166360" y="4900376"/>
-            <a:ext cx="2045970" cy="369332"/>
+              <a:rPr lang="en-US" dirty="0" smtClean="0">
+                <a:solidFill>
+                  <a:schemeClr val="bg1">
+                    <a:lumMod val="75000"/>
+                  </a:schemeClr>
+                </a:solidFill>
+                <a:effectLst>
+                  <a:outerShdw blurRad="50800" dist="177800" dir="4080000" sx="105000" sy="105000" algn="ctr" rotWithShape="0">
+                    <a:srgbClr val="000000">
+                      <a:alpha val="43137"/>
+                    </a:srgbClr>
+                  </a:outerShdw>
+                </a:effectLst>
+              </a:rPr>
+              <a:t>Cancel</a:t>
+            </a:r>
+            <a:endParaRPr lang="en-US" dirty="0" smtClean="0">
+              <a:solidFill>
+                <a:schemeClr val="bg1">
+                  <a:lumMod val="75000"/>
+                </a:schemeClr>
+              </a:solidFill>
+              <a:effectLst>
+                <a:outerShdw blurRad="50800" dist="177800" dir="4080000" sx="105000" sy="105000" algn="ctr" rotWithShape="0">
+                  <a:srgbClr val="000000">
+                    <a:alpha val="43137"/>
+                  </a:srgbClr>
+                </a:outerShdw>
+              </a:effectLst>
+            </a:endParaRPr>
+          </a:p>
+        </p:txBody>
+      </p:sp>
+      <p:pic>
+        <p:nvPicPr>
+          <p:cNvPr id="13" name="Picture 12"/>
+          <p:cNvPicPr>
+            <a:picLocks noChangeAspect="1"/>
+          </p:cNvPicPr>
+          <p:nvPr/>
+        </p:nvPicPr>
+        <p:blipFill>
+          <a:blip r:embed="rId4">
+            <a:extLst>
+              <a:ext uri="{28A0092B-C50C-407E-A947-70E740481C1C}">
+                <a14:useLocalDpi xmlns:a14="http://schemas.microsoft.com/office/drawing/2010/main" val="0"/>
+              </a:ext>
+            </a:extLst>
+          </a:blip>
+          <a:stretch>
+            <a:fillRect/>
+          </a:stretch>
+        </p:blipFill>
+        <p:spPr>
+          <a:xfrm>
+            <a:off x="4637576" y="1045353"/>
+            <a:ext cx="2050676" cy="1285875"/>
           </a:xfrm>
           <a:prstGeom prst="rect">
             <a:avLst/>
           </a:prstGeom>
-          <a:noFill/>
-        </p:spPr>
-        <p:txBody>
-          <a:bodyPr wrap="square" rtlCol="0">
-            <a:spAutoFit/>
-          </a:bodyPr>
-          <a:lstStyle/>
-          <a:p>
-            <a:pPr algn="ctr"/>
-            <a:r>
-              <a:rPr lang="en-US" dirty="0" smtClean="0"/>
-              <a:t>Phone Number</a:t>
-            </a:r>
-            <a:endParaRPr lang="en-US" dirty="0"/>
-          </a:p>
-        </p:txBody>
-      </p:sp>
-      <p:sp>
-        <p:nvSpPr>
-          <p:cNvPr id="20" name="Rounded Rectangle 19"/>
-          <p:cNvSpPr/>
-          <p:nvPr/>
-        </p:nvSpPr>
-        <p:spPr>
-          <a:xfrm>
-            <a:off x="5040630" y="5790117"/>
-            <a:ext cx="1036320" cy="411480"/>
-          </a:xfrm>
-          <a:prstGeom prst="roundRect">
-            <a:avLst/>
-          </a:prstGeom>
-        </p:spPr>
-        <p:style>
-          <a:lnRef idx="2">
-            <a:schemeClr val="accent1">
-              <a:shade val="50000"/>
-            </a:schemeClr>
-          </a:lnRef>
-          <a:fillRef idx="1">
-            <a:schemeClr val="accent1"/>
-          </a:fillRef>
-          <a:effectRef idx="0">
-            <a:schemeClr val="accent1"/>
-          </a:effectRef>
-          <a:fontRef idx="minor">
-            <a:schemeClr val="lt1"/>
-          </a:fontRef>
-        </p:style>
-        <p:txBody>
-          <a:bodyPr rtlCol="0" anchor="ctr"/>
-          <a:lstStyle/>
-          <a:p>
-            <a:pPr algn="ctr"/>
-            <a:endParaRPr lang="en-US"/>
-          </a:p>
-        </p:txBody>
-      </p:sp>
-      <p:sp>
-        <p:nvSpPr>
-          <p:cNvPr id="21" name="Rounded Rectangle 20"/>
-          <p:cNvSpPr/>
-          <p:nvPr/>
-        </p:nvSpPr>
-        <p:spPr>
-          <a:xfrm>
-            <a:off x="6347460" y="5790117"/>
-            <a:ext cx="1036320" cy="411480"/>
-          </a:xfrm>
-          <a:prstGeom prst="roundRect">
-            <a:avLst/>
-          </a:prstGeom>
-        </p:spPr>
-        <p:style>
-          <a:lnRef idx="2">
-            <a:schemeClr val="accent1">
-              <a:shade val="50000"/>
-            </a:schemeClr>
-          </a:lnRef>
-          <a:fillRef idx="1">
-            <a:schemeClr val="accent1"/>
-          </a:fillRef>
-          <a:effectRef idx="0">
-            <a:schemeClr val="accent1"/>
-          </a:effectRef>
-          <a:fontRef idx="minor">
-            <a:schemeClr val="lt1"/>
-          </a:fontRef>
-        </p:style>
-        <p:txBody>
-          <a:bodyPr rtlCol="0" anchor="ctr"/>
-          <a:lstStyle/>
-          <a:p>
-            <a:pPr algn="ctr"/>
-            <a:endParaRPr lang="en-US"/>
-          </a:p>
-        </p:txBody>
-      </p:sp>
-      <p:sp>
-        <p:nvSpPr>
-          <p:cNvPr id="22" name="TextBox 21"/>
-          <p:cNvSpPr txBox="1"/>
-          <p:nvPr/>
-        </p:nvSpPr>
-        <p:spPr>
-          <a:xfrm>
-            <a:off x="5144915" y="5790117"/>
-            <a:ext cx="827750" cy="369332"/>
-          </a:xfrm>
-          <a:prstGeom prst="rect">
-            <a:avLst/>
-          </a:prstGeom>
-          <a:noFill/>
-        </p:spPr>
-        <p:txBody>
-          <a:bodyPr wrap="square" rtlCol="0">
-            <a:spAutoFit/>
-          </a:bodyPr>
-          <a:lstStyle/>
-          <a:p>
-            <a:pPr algn="ctr"/>
-            <a:r>
-              <a:rPr lang="en-US" smtClean="0"/>
-              <a:t>Create</a:t>
-            </a:r>
-            <a:endParaRPr lang="en-US" dirty="0"/>
-          </a:p>
-        </p:txBody>
-      </p:sp>
-      <p:sp>
-        <p:nvSpPr>
-          <p:cNvPr id="23" name="TextBox 22"/>
-          <p:cNvSpPr txBox="1"/>
-          <p:nvPr/>
-        </p:nvSpPr>
-        <p:spPr>
-          <a:xfrm>
-            <a:off x="6451745" y="5815942"/>
-            <a:ext cx="827750" cy="369332"/>
-          </a:xfrm>
-          <a:prstGeom prst="rect">
-            <a:avLst/>
-          </a:prstGeom>
-          <a:noFill/>
-        </p:spPr>
-        <p:txBody>
-          <a:bodyPr wrap="square" rtlCol="0">
-            <a:spAutoFit/>
-          </a:bodyPr>
-          <a:lstStyle/>
-          <a:p>
-            <a:pPr algn="ctr"/>
-            <a:r>
-              <a:rPr lang="en-US" dirty="0" smtClean="0"/>
-              <a:t>Cancel</a:t>
-            </a:r>
-          </a:p>
-        </p:txBody>
-      </p:sp>
-      <p:sp>
-        <p:nvSpPr>
-          <p:cNvPr id="24" name="TextBox 23"/>
-          <p:cNvSpPr txBox="1"/>
-          <p:nvPr/>
-        </p:nvSpPr>
-        <p:spPr>
-          <a:xfrm>
-            <a:off x="331470" y="502920"/>
-            <a:ext cx="2023110" cy="369332"/>
-          </a:xfrm>
-          <a:prstGeom prst="rect">
-            <a:avLst/>
-          </a:prstGeom>
-          <a:noFill/>
-        </p:spPr>
-        <p:txBody>
-          <a:bodyPr wrap="square" rtlCol="0">
-            <a:spAutoFit/>
-          </a:bodyPr>
-          <a:lstStyle/>
-          <a:p>
-            <a:r>
-              <a:rPr lang="en-US" dirty="0" smtClean="0"/>
-              <a:t>Create Account</a:t>
-            </a:r>
-            <a:endParaRPr lang="en-US" dirty="0"/>
-          </a:p>
-        </p:txBody>
-      </p:sp>
-      <p:sp>
-        <p:nvSpPr>
-          <p:cNvPr id="25" name="TextBox 24"/>
-          <p:cNvSpPr txBox="1"/>
-          <p:nvPr/>
-        </p:nvSpPr>
-        <p:spPr>
-          <a:xfrm>
-            <a:off x="599287" y="1722644"/>
-            <a:ext cx="2023110" cy="1077218"/>
-          </a:xfrm>
-          <a:prstGeom prst="rect">
-            <a:avLst/>
-          </a:prstGeom>
-          <a:noFill/>
-        </p:spPr>
-        <p:txBody>
-          <a:bodyPr wrap="square" rtlCol="0">
-            <a:spAutoFit/>
-          </a:bodyPr>
-          <a:lstStyle/>
-          <a:p>
-            <a:pPr algn="ctr"/>
-            <a:r>
-              <a:rPr lang="en-US" sz="3200" smtClean="0"/>
-              <a:t>Create Account</a:t>
-            </a:r>
-            <a:endParaRPr lang="en-US" sz="3200" dirty="0"/>
-          </a:p>
-        </p:txBody>
-      </p:sp>
+          <a:effectLst>
+            <a:glow rad="101600">
+              <a:schemeClr val="accent3">
+                <a:satMod val="175000"/>
+                <a:alpha val="40000"/>
+              </a:schemeClr>
+            </a:glow>
+            <a:outerShdw blurRad="50800" dist="88900" dir="2760000" algn="ctr" rotWithShape="0">
+              <a:srgbClr val="000000">
+                <a:alpha val="43137"/>
+              </a:srgbClr>
+            </a:outerShdw>
+          </a:effectLst>
+        </p:spPr>
+      </p:pic>
     </p:spTree>
     <p:extLst>
       <p:ext uri="{BB962C8B-B14F-4D97-AF65-F5344CB8AC3E}">
-        <p14:creationId xmlns:p14="http://schemas.microsoft.com/office/powerpoint/2010/main" val="1632788802"/>
+        <p14:creationId xmlns:p14="http://schemas.microsoft.com/office/powerpoint/2010/main" val="926088044"/>
       </p:ext>
     </p:extLst>
   </p:cSld>
@@ -5870,23 +6552,50 @@
           <a:chExt cx="0" cy="0"/>
         </a:xfrm>
       </p:grpSpPr>
-      <p:sp>
-        <p:nvSpPr>
-          <p:cNvPr id="4" name="Rounded Rectangle 3"/>
+      <p:pic>
+        <p:nvPicPr>
+          <p:cNvPr id="4" name="Picture 3"/>
+          <p:cNvPicPr>
+            <a:picLocks noChangeAspect="1"/>
+          </p:cNvPicPr>
+          <p:nvPr/>
+        </p:nvPicPr>
+        <p:blipFill>
+          <a:blip r:embed="rId3">
+            <a:extLst>
+              <a:ext uri="{28A0092B-C50C-407E-A947-70E740481C1C}">
+                <a14:useLocalDpi xmlns:a14="http://schemas.microsoft.com/office/drawing/2010/main" val="0"/>
+              </a:ext>
+            </a:extLst>
+          </a:blip>
+          <a:stretch>
+            <a:fillRect/>
+          </a:stretch>
+        </p:blipFill>
+        <p:spPr>
+          <a:xfrm>
+            <a:off x="3945890" y="0"/>
+            <a:ext cx="3440545" cy="6858000"/>
+          </a:xfrm>
+          <a:prstGeom prst="rect">
+            <a:avLst/>
+          </a:prstGeom>
+        </p:spPr>
+      </p:pic>
+      <p:sp>
+        <p:nvSpPr>
+          <p:cNvPr id="6" name="Rectangle 5"/>
           <p:cNvSpPr/>
           <p:nvPr/>
         </p:nvSpPr>
         <p:spPr>
           <a:xfrm>
-            <a:off x="4116651" y="244602"/>
-            <a:ext cx="4114800" cy="6318504"/>
-          </a:xfrm>
-          <a:prstGeom prst="roundRect">
-            <a:avLst/>
-          </a:prstGeom>
-          <a:solidFill>
-            <a:schemeClr val="bg1"/>
-          </a:solidFill>
+            <a:off x="4108436" y="777240"/>
+            <a:ext cx="3108960" cy="4949190"/>
+          </a:xfrm>
+          <a:prstGeom prst="rect">
+            <a:avLst/>
+          </a:prstGeom>
         </p:spPr>
         <p:style>
           <a:lnRef idx="2">
@@ -5894,8 +6603,8 @@
               <a:shade val="50000"/>
             </a:schemeClr>
           </a:lnRef>
-          <a:fillRef idx="1">
-            <a:schemeClr val="accent1"/>
+          <a:fillRef idx="1003">
+            <a:schemeClr val="dk2"/>
           </a:fillRef>
           <a:effectRef idx="0">
             <a:schemeClr val="accent1"/>
@@ -5909,20 +6618,186 @@
           <a:lstStyle/>
           <a:p>
             <a:pPr algn="ctr"/>
-            <a:endParaRPr lang="en-US" dirty="0"/>
-          </a:p>
-        </p:txBody>
-      </p:sp>
-      <p:sp>
-        <p:nvSpPr>
-          <p:cNvPr id="5" name="TextBox 4"/>
+            <a:endParaRPr lang="en-US" dirty="0" smtClean="0">
+              <a:solidFill>
+                <a:schemeClr val="bg1">
+                  <a:lumMod val="75000"/>
+                </a:schemeClr>
+              </a:solidFill>
+              <a:effectLst>
+                <a:outerShdw blurRad="50800" dist="177800" dir="4080000" algn="ctr" rotWithShape="0">
+                  <a:srgbClr val="000000">
+                    <a:alpha val="43137"/>
+                  </a:srgbClr>
+                </a:outerShdw>
+              </a:effectLst>
+            </a:endParaRPr>
+          </a:p>
+          <a:p>
+            <a:pPr algn="ctr"/>
+            <a:endParaRPr lang="en-US" dirty="0" smtClean="0">
+              <a:solidFill>
+                <a:schemeClr val="bg1">
+                  <a:lumMod val="75000"/>
+                </a:schemeClr>
+              </a:solidFill>
+              <a:effectLst>
+                <a:outerShdw blurRad="50800" dist="177800" dir="4080000" algn="ctr" rotWithShape="0">
+                  <a:srgbClr val="000000">
+                    <a:alpha val="43137"/>
+                  </a:srgbClr>
+                </a:outerShdw>
+              </a:effectLst>
+            </a:endParaRPr>
+          </a:p>
+          <a:p>
+            <a:pPr algn="ctr"/>
+            <a:endParaRPr lang="en-US" dirty="0" smtClean="0">
+              <a:solidFill>
+                <a:schemeClr val="bg1">
+                  <a:lumMod val="75000"/>
+                </a:schemeClr>
+              </a:solidFill>
+              <a:effectLst>
+                <a:outerShdw blurRad="50800" dist="177800" dir="4080000" algn="ctr" rotWithShape="0">
+                  <a:srgbClr val="000000">
+                    <a:alpha val="43137"/>
+                  </a:srgbClr>
+                </a:outerShdw>
+              </a:effectLst>
+            </a:endParaRPr>
+          </a:p>
+          <a:p>
+            <a:pPr algn="ctr"/>
+            <a:endParaRPr lang="en-US" dirty="0" smtClean="0">
+              <a:solidFill>
+                <a:schemeClr val="bg1">
+                  <a:lumMod val="75000"/>
+                </a:schemeClr>
+              </a:solidFill>
+              <a:effectLst>
+                <a:outerShdw blurRad="50800" dist="177800" dir="4080000" algn="ctr" rotWithShape="0">
+                  <a:srgbClr val="000000">
+                    <a:alpha val="43137"/>
+                  </a:srgbClr>
+                </a:outerShdw>
+              </a:effectLst>
+            </a:endParaRPr>
+          </a:p>
+          <a:p>
+            <a:pPr algn="ctr"/>
+            <a:endParaRPr lang="en-US" dirty="0" smtClean="0">
+              <a:solidFill>
+                <a:schemeClr val="bg1">
+                  <a:lumMod val="75000"/>
+                </a:schemeClr>
+              </a:solidFill>
+              <a:effectLst>
+                <a:outerShdw blurRad="50800" dist="177800" dir="4080000" algn="ctr" rotWithShape="0">
+                  <a:srgbClr val="000000">
+                    <a:alpha val="43137"/>
+                  </a:srgbClr>
+                </a:outerShdw>
+              </a:effectLst>
+            </a:endParaRPr>
+          </a:p>
+          <a:p>
+            <a:pPr algn="ctr"/>
+            <a:endParaRPr lang="en-US" dirty="0" smtClean="0">
+              <a:solidFill>
+                <a:schemeClr val="bg1">
+                  <a:lumMod val="75000"/>
+                </a:schemeClr>
+              </a:solidFill>
+              <a:effectLst>
+                <a:outerShdw blurRad="50800" dist="177800" dir="4080000" algn="ctr" rotWithShape="0">
+                  <a:srgbClr val="000000">
+                    <a:alpha val="43137"/>
+                  </a:srgbClr>
+                </a:outerShdw>
+              </a:effectLst>
+            </a:endParaRPr>
+          </a:p>
+          <a:p>
+            <a:pPr algn="ctr"/>
+            <a:endParaRPr lang="en-US" dirty="0" smtClean="0">
+              <a:solidFill>
+                <a:schemeClr val="bg1">
+                  <a:lumMod val="75000"/>
+                </a:schemeClr>
+              </a:solidFill>
+              <a:effectLst>
+                <a:outerShdw blurRad="50800" dist="177800" dir="4080000" algn="ctr" rotWithShape="0">
+                  <a:srgbClr val="000000">
+                    <a:alpha val="43137"/>
+                  </a:srgbClr>
+                </a:outerShdw>
+              </a:effectLst>
+            </a:endParaRPr>
+          </a:p>
+          <a:p>
+            <a:pPr algn="ctr"/>
+            <a:endParaRPr lang="en-US" dirty="0" smtClean="0">
+              <a:solidFill>
+                <a:schemeClr val="bg1">
+                  <a:lumMod val="75000"/>
+                </a:schemeClr>
+              </a:solidFill>
+              <a:effectLst>
+                <a:outerShdw blurRad="50800" dist="177800" dir="4080000" algn="ctr" rotWithShape="0">
+                  <a:srgbClr val="000000">
+                    <a:alpha val="43137"/>
+                  </a:srgbClr>
+                </a:outerShdw>
+              </a:effectLst>
+            </a:endParaRPr>
+          </a:p>
+          <a:p>
+            <a:pPr algn="ctr"/>
+            <a:endParaRPr lang="en-US" dirty="0" smtClean="0">
+              <a:solidFill>
+                <a:schemeClr val="bg1">
+                  <a:lumMod val="75000"/>
+                </a:schemeClr>
+              </a:solidFill>
+              <a:effectLst>
+                <a:outerShdw blurRad="50800" dist="177800" dir="4080000" algn="ctr" rotWithShape="0">
+                  <a:srgbClr val="000000">
+                    <a:alpha val="43137"/>
+                  </a:srgbClr>
+                </a:outerShdw>
+              </a:effectLst>
+            </a:endParaRPr>
+          </a:p>
+          <a:p>
+            <a:pPr algn="ctr"/>
+            <a:endParaRPr lang="en-US" dirty="0" smtClean="0">
+              <a:solidFill>
+                <a:schemeClr val="bg1">
+                  <a:lumMod val="75000"/>
+                </a:schemeClr>
+              </a:solidFill>
+              <a:effectLst>
+                <a:outerShdw blurRad="50800" dist="177800" dir="4080000" algn="ctr" rotWithShape="0">
+                  <a:srgbClr val="000000">
+                    <a:alpha val="43137"/>
+                  </a:srgbClr>
+                </a:outerShdw>
+              </a:effectLst>
+            </a:endParaRPr>
+          </a:p>
+        </p:txBody>
+      </p:sp>
+      <p:sp>
+        <p:nvSpPr>
+          <p:cNvPr id="7" name="TextBox 6"/>
           <p:cNvSpPr txBox="1"/>
           <p:nvPr/>
         </p:nvSpPr>
         <p:spPr>
           <a:xfrm>
             <a:off x="331470" y="502920"/>
-            <a:ext cx="2023110" cy="369332"/>
+            <a:ext cx="2251710" cy="1569660"/>
           </a:xfrm>
           <a:prstGeom prst="rect">
             <a:avLst/>
@@ -5935,139 +6810,185 @@
           </a:bodyPr>
           <a:lstStyle/>
           <a:p>
-            <a:r>
-              <a:rPr lang="en-US" dirty="0" smtClean="0"/>
-              <a:t>Forgot Password</a:t>
-            </a:r>
-          </a:p>
-        </p:txBody>
-      </p:sp>
-      <p:sp>
-        <p:nvSpPr>
-          <p:cNvPr id="6" name="Rounded Rectangle 5"/>
+            <a:pPr algn="ctr"/>
+            <a:r>
+              <a:rPr lang="en-US" sz="3200" u="sng" dirty="0" smtClean="0">
+                <a:latin typeface="Arial" charset="0"/>
+                <a:ea typeface="Arial" charset="0"/>
+                <a:cs typeface="Arial" charset="0"/>
+              </a:rPr>
+              <a:t>Change</a:t>
+            </a:r>
+          </a:p>
+          <a:p>
+            <a:pPr algn="ctr"/>
+            <a:r>
+              <a:rPr lang="en-US" sz="3200" u="sng" dirty="0" smtClean="0">
+                <a:latin typeface="Arial" charset="0"/>
+                <a:ea typeface="Arial" charset="0"/>
+                <a:cs typeface="Arial" charset="0"/>
+              </a:rPr>
+              <a:t>Password</a:t>
+            </a:r>
+          </a:p>
+          <a:p>
+            <a:pPr algn="ctr"/>
+            <a:r>
+              <a:rPr lang="en-US" sz="3200" u="sng" dirty="0" smtClean="0">
+                <a:latin typeface="Arial" charset="0"/>
+                <a:ea typeface="Arial" charset="0"/>
+                <a:cs typeface="Arial" charset="0"/>
+              </a:rPr>
+              <a:t>Page</a:t>
+            </a:r>
+            <a:endParaRPr lang="en-US" sz="3200" u="sng" dirty="0">
+              <a:latin typeface="Arial" charset="0"/>
+              <a:ea typeface="Arial" charset="0"/>
+              <a:cs typeface="Arial" charset="0"/>
+            </a:endParaRPr>
+          </a:p>
+        </p:txBody>
+      </p:sp>
+      <p:sp>
+        <p:nvSpPr>
+          <p:cNvPr id="11" name="Rectangle 10"/>
           <p:cNvSpPr/>
           <p:nvPr/>
         </p:nvSpPr>
         <p:spPr>
           <a:xfrm>
-            <a:off x="5002476" y="3820430"/>
-            <a:ext cx="2343150" cy="411480"/>
-          </a:xfrm>
-          <a:prstGeom prst="roundRect">
-            <a:avLst/>
-          </a:prstGeom>
-        </p:spPr>
-        <p:style>
-          <a:lnRef idx="2">
-            <a:schemeClr val="accent1">
-              <a:shade val="50000"/>
-            </a:schemeClr>
-          </a:lnRef>
-          <a:fillRef idx="1">
-            <a:schemeClr val="accent1"/>
-          </a:fillRef>
-          <a:effectRef idx="0">
-            <a:schemeClr val="accent1"/>
-          </a:effectRef>
-          <a:fontRef idx="minor">
-            <a:schemeClr val="lt1"/>
-          </a:fontRef>
-        </p:style>
-        <p:txBody>
-          <a:bodyPr rtlCol="0" anchor="ctr"/>
-          <a:lstStyle/>
-          <a:p>
-            <a:pPr algn="ctr"/>
-            <a:endParaRPr lang="en-US"/>
-          </a:p>
-        </p:txBody>
-      </p:sp>
-      <p:sp>
-        <p:nvSpPr>
-          <p:cNvPr id="11" name="TextBox 10"/>
-          <p:cNvSpPr txBox="1"/>
-          <p:nvPr/>
-        </p:nvSpPr>
-        <p:spPr>
-          <a:xfrm>
-            <a:off x="5082486" y="1166967"/>
-            <a:ext cx="2183130" cy="1200329"/>
+            <a:off x="5215900" y="4661385"/>
+            <a:ext cx="848309" cy="369332"/>
           </a:xfrm>
           <a:prstGeom prst="rect">
             <a:avLst/>
           </a:prstGeom>
-          <a:noFill/>
-        </p:spPr>
-        <p:txBody>
-          <a:bodyPr wrap="square" rtlCol="0">
+        </p:spPr>
+        <p:txBody>
+          <a:bodyPr wrap="none">
             <a:spAutoFit/>
           </a:bodyPr>
           <a:lstStyle/>
           <a:p>
             <a:pPr algn="ctr"/>
             <a:r>
-              <a:rPr lang="en-US" sz="3600" dirty="0" smtClean="0"/>
-              <a:t>Reset Password</a:t>
-            </a:r>
-            <a:endParaRPr lang="en-US" sz="3600" dirty="0"/>
-          </a:p>
-        </p:txBody>
-      </p:sp>
-      <p:sp>
-        <p:nvSpPr>
-          <p:cNvPr id="12" name="TextBox 11"/>
-          <p:cNvSpPr txBox="1"/>
-          <p:nvPr/>
-        </p:nvSpPr>
-        <p:spPr>
-          <a:xfrm>
-            <a:off x="4350966" y="3543431"/>
-            <a:ext cx="3646170" cy="276999"/>
+              <a:rPr lang="en-US" smtClean="0">
+                <a:solidFill>
+                  <a:schemeClr val="bg1">
+                    <a:lumMod val="75000"/>
+                  </a:schemeClr>
+                </a:solidFill>
+                <a:effectLst>
+                  <a:outerShdw blurRad="50800" dist="177800" dir="4080000" sx="105000" sy="105000" algn="ctr" rotWithShape="0">
+                    <a:srgbClr val="000000">
+                      <a:alpha val="43137"/>
+                    </a:srgbClr>
+                  </a:outerShdw>
+                </a:effectLst>
+              </a:rPr>
+              <a:t>Submit</a:t>
+            </a:r>
+            <a:endParaRPr lang="en-US" dirty="0" smtClean="0">
+              <a:solidFill>
+                <a:schemeClr val="bg1">
+                  <a:lumMod val="75000"/>
+                </a:schemeClr>
+              </a:solidFill>
+              <a:effectLst>
+                <a:outerShdw blurRad="50800" dist="177800" dir="4080000" sx="105000" sy="105000" algn="ctr" rotWithShape="0">
+                  <a:srgbClr val="000000">
+                    <a:alpha val="43137"/>
+                  </a:srgbClr>
+                </a:outerShdw>
+              </a:effectLst>
+            </a:endParaRPr>
+          </a:p>
+        </p:txBody>
+      </p:sp>
+      <p:sp>
+        <p:nvSpPr>
+          <p:cNvPr id="12" name="Rectangle 11"/>
+          <p:cNvSpPr/>
+          <p:nvPr/>
+        </p:nvSpPr>
+        <p:spPr>
+          <a:xfrm>
+            <a:off x="5236740" y="5086528"/>
+            <a:ext cx="806631" cy="369332"/>
           </a:xfrm>
           <a:prstGeom prst="rect">
             <a:avLst/>
           </a:prstGeom>
-          <a:noFill/>
-        </p:spPr>
-        <p:txBody>
-          <a:bodyPr wrap="square" rtlCol="0">
+        </p:spPr>
+        <p:txBody>
+          <a:bodyPr wrap="none">
             <a:spAutoFit/>
           </a:bodyPr>
           <a:lstStyle/>
           <a:p>
             <a:pPr algn="ctr"/>
             <a:r>
-              <a:rPr lang="en-US" sz="1200" smtClean="0"/>
-              <a:t>*Enter Email </a:t>
-            </a:r>
-            <a:r>
-              <a:rPr lang="en-US" sz="1200" dirty="0" smtClean="0"/>
-              <a:t>Phone Number Or Username</a:t>
-            </a:r>
-          </a:p>
-        </p:txBody>
-      </p:sp>
-      <p:sp>
-        <p:nvSpPr>
-          <p:cNvPr id="14" name="Rounded Rectangle 13"/>
+              <a:rPr lang="en-US" dirty="0" smtClean="0">
+                <a:solidFill>
+                  <a:schemeClr val="bg1">
+                    <a:lumMod val="75000"/>
+                  </a:schemeClr>
+                </a:solidFill>
+                <a:effectLst>
+                  <a:outerShdw blurRad="50800" dist="177800" dir="4080000" sx="105000" sy="105000" algn="ctr" rotWithShape="0">
+                    <a:srgbClr val="000000">
+                      <a:alpha val="43137"/>
+                    </a:srgbClr>
+                  </a:outerShdw>
+                </a:effectLst>
+              </a:rPr>
+              <a:t>Cancel</a:t>
+            </a:r>
+            <a:endParaRPr lang="en-US" dirty="0" smtClean="0">
+              <a:solidFill>
+                <a:schemeClr val="bg1">
+                  <a:lumMod val="75000"/>
+                </a:schemeClr>
+              </a:solidFill>
+              <a:effectLst>
+                <a:outerShdw blurRad="50800" dist="177800" dir="4080000" sx="105000" sy="105000" algn="ctr" rotWithShape="0">
+                  <a:srgbClr val="000000">
+                    <a:alpha val="43137"/>
+                  </a:srgbClr>
+                </a:outerShdw>
+              </a:effectLst>
+            </a:endParaRPr>
+          </a:p>
+        </p:txBody>
+      </p:sp>
+      <p:sp>
+        <p:nvSpPr>
+          <p:cNvPr id="13" name="Rounded Rectangle 12"/>
           <p:cNvSpPr/>
           <p:nvPr/>
         </p:nvSpPr>
         <p:spPr>
           <a:xfrm>
-            <a:off x="5774001" y="4780288"/>
-            <a:ext cx="800100" cy="580382"/>
+            <a:off x="4194159" y="3105208"/>
+            <a:ext cx="2937510" cy="457200"/>
           </a:xfrm>
           <a:prstGeom prst="roundRect">
             <a:avLst/>
           </a:prstGeom>
+          <a:effectLst>
+            <a:outerShdw blurRad="50800" dist="25400" dir="2880000" algn="ctr" rotWithShape="0">
+              <a:srgbClr val="000000">
+                <a:alpha val="43137"/>
+              </a:srgbClr>
+            </a:outerShdw>
+          </a:effectLst>
         </p:spPr>
         <p:style>
           <a:lnRef idx="1">
             <a:schemeClr val="dk1"/>
           </a:lnRef>
-          <a:fillRef idx="2">
-            <a:schemeClr val="dk1"/>
+          <a:fillRef idx="1003">
+            <a:schemeClr val="lt2"/>
           </a:fillRef>
           <a:effectRef idx="1">
             <a:schemeClr val="dk1"/>
@@ -6082,17 +7003,215 @@
           <a:p>
             <a:pPr algn="ctr"/>
             <a:r>
-              <a:rPr lang="en-US" smtClean="0"/>
-              <a:t>Send Email</a:t>
-            </a:r>
-            <a:endParaRPr lang="en-US" dirty="0"/>
-          </a:p>
-        </p:txBody>
-      </p:sp>
+              <a:rPr lang="en-US" dirty="0" smtClean="0"/>
+              <a:t>Verification Code</a:t>
+            </a:r>
+          </a:p>
+        </p:txBody>
+      </p:sp>
+      <p:sp>
+        <p:nvSpPr>
+          <p:cNvPr id="14" name="Rounded Rectangle 13"/>
+          <p:cNvSpPr/>
+          <p:nvPr/>
+        </p:nvSpPr>
+        <p:spPr>
+          <a:xfrm>
+            <a:off x="4194159" y="3631524"/>
+            <a:ext cx="2937510" cy="457200"/>
+          </a:xfrm>
+          <a:prstGeom prst="roundRect">
+            <a:avLst/>
+          </a:prstGeom>
+          <a:effectLst>
+            <a:outerShdw blurRad="50800" dist="25400" dir="2880000" algn="ctr" rotWithShape="0">
+              <a:srgbClr val="000000">
+                <a:alpha val="43137"/>
+              </a:srgbClr>
+            </a:outerShdw>
+          </a:effectLst>
+        </p:spPr>
+        <p:style>
+          <a:lnRef idx="1">
+            <a:schemeClr val="dk1"/>
+          </a:lnRef>
+          <a:fillRef idx="1003">
+            <a:schemeClr val="lt2"/>
+          </a:fillRef>
+          <a:effectRef idx="1">
+            <a:schemeClr val="dk1"/>
+          </a:effectRef>
+          <a:fontRef idx="minor">
+            <a:schemeClr val="dk1"/>
+          </a:fontRef>
+        </p:style>
+        <p:txBody>
+          <a:bodyPr rtlCol="0" anchor="ctr"/>
+          <a:lstStyle/>
+          <a:p>
+            <a:pPr algn="ctr"/>
+            <a:r>
+              <a:rPr lang="en-US" dirty="0" smtClean="0"/>
+              <a:t>New Password</a:t>
+            </a:r>
+          </a:p>
+        </p:txBody>
+      </p:sp>
+      <p:sp>
+        <p:nvSpPr>
+          <p:cNvPr id="15" name="Rounded Rectangle 14"/>
+          <p:cNvSpPr/>
+          <p:nvPr/>
+        </p:nvSpPr>
+        <p:spPr>
+          <a:xfrm>
+            <a:off x="4194159" y="4150785"/>
+            <a:ext cx="2937510" cy="457200"/>
+          </a:xfrm>
+          <a:prstGeom prst="roundRect">
+            <a:avLst/>
+          </a:prstGeom>
+          <a:effectLst>
+            <a:outerShdw blurRad="50800" dist="25400" dir="2880000" algn="ctr" rotWithShape="0">
+              <a:srgbClr val="000000">
+                <a:alpha val="43137"/>
+              </a:srgbClr>
+            </a:outerShdw>
+          </a:effectLst>
+        </p:spPr>
+        <p:style>
+          <a:lnRef idx="1">
+            <a:schemeClr val="dk1"/>
+          </a:lnRef>
+          <a:fillRef idx="1003">
+            <a:schemeClr val="lt2"/>
+          </a:fillRef>
+          <a:effectRef idx="1">
+            <a:schemeClr val="dk1"/>
+          </a:effectRef>
+          <a:fontRef idx="minor">
+            <a:schemeClr val="dk1"/>
+          </a:fontRef>
+        </p:style>
+        <p:txBody>
+          <a:bodyPr rtlCol="0" anchor="ctr"/>
+          <a:lstStyle/>
+          <a:p>
+            <a:pPr algn="ctr"/>
+            <a:r>
+              <a:rPr lang="en-US" smtClean="0"/>
+              <a:t>Confirm Password</a:t>
+            </a:r>
+            <a:endParaRPr lang="en-US" dirty="0" smtClean="0"/>
+          </a:p>
+        </p:txBody>
+      </p:sp>
+      <p:sp>
+        <p:nvSpPr>
+          <p:cNvPr id="16" name="TextBox 15"/>
+          <p:cNvSpPr txBox="1"/>
+          <p:nvPr/>
+        </p:nvSpPr>
+        <p:spPr>
+          <a:xfrm>
+            <a:off x="4458898" y="2513079"/>
+            <a:ext cx="2408032" cy="461665"/>
+          </a:xfrm>
+          <a:prstGeom prst="rect">
+            <a:avLst/>
+          </a:prstGeom>
+          <a:noFill/>
+        </p:spPr>
+        <p:txBody>
+          <a:bodyPr wrap="none" rtlCol="0">
+            <a:spAutoFit/>
+          </a:bodyPr>
+          <a:lstStyle/>
+          <a:p>
+            <a:pPr algn="ctr"/>
+            <a:r>
+              <a:rPr lang="en-US" sz="2400" smtClean="0">
+                <a:solidFill>
+                  <a:schemeClr val="bg1"/>
+                </a:solidFill>
+                <a:effectLst>
+                  <a:outerShdw blurRad="50800" dist="266700" dir="1980000" algn="ctr" rotWithShape="0">
+                    <a:srgbClr val="000000">
+                      <a:alpha val="43137"/>
+                    </a:srgbClr>
+                  </a:outerShdw>
+                </a:effectLst>
+                <a:latin typeface="Apple Chancery" charset="0"/>
+                <a:ea typeface="Apple Chancery" charset="0"/>
+                <a:cs typeface="Apple Chancery" charset="0"/>
+              </a:rPr>
+              <a:t>Password Change</a:t>
+            </a:r>
+            <a:endParaRPr lang="en-US" sz="2400" dirty="0">
+              <a:solidFill>
+                <a:schemeClr val="bg1"/>
+              </a:solidFill>
+              <a:effectLst>
+                <a:outerShdw blurRad="50800" dist="266700" dir="1980000" algn="ctr" rotWithShape="0">
+                  <a:srgbClr val="000000">
+                    <a:alpha val="43137"/>
+                  </a:srgbClr>
+                </a:outerShdw>
+              </a:effectLst>
+              <a:latin typeface="Apple Chancery" charset="0"/>
+              <a:ea typeface="Apple Chancery" charset="0"/>
+              <a:cs typeface="Apple Chancery" charset="0"/>
+            </a:endParaRPr>
+          </a:p>
+        </p:txBody>
+      </p:sp>
+      <p:pic>
+        <p:nvPicPr>
+          <p:cNvPr id="17" name="Picture 16"/>
+          <p:cNvPicPr>
+            <a:picLocks noChangeAspect="1"/>
+          </p:cNvPicPr>
+          <p:nvPr/>
+        </p:nvPicPr>
+        <p:blipFill>
+          <a:blip r:embed="rId4">
+            <a:extLst>
+              <a:ext uri="{28A0092B-C50C-407E-A947-70E740481C1C}">
+                <a14:useLocalDpi xmlns:a14="http://schemas.microsoft.com/office/drawing/2010/main" val="0"/>
+              </a:ext>
+            </a:extLst>
+          </a:blip>
+          <a:stretch>
+            <a:fillRect/>
+          </a:stretch>
+        </p:blipFill>
+        <p:spPr>
+          <a:xfrm>
+            <a:off x="4637576" y="1072632"/>
+            <a:ext cx="2050676" cy="1285875"/>
+          </a:xfrm>
+          <a:prstGeom prst="rect">
+            <a:avLst/>
+          </a:prstGeom>
+          <a:effectLst>
+            <a:glow rad="101600">
+              <a:schemeClr val="accent3">
+                <a:satMod val="175000"/>
+                <a:alpha val="40000"/>
+              </a:schemeClr>
+            </a:glow>
+            <a:outerShdw blurRad="50800" dist="88900" dir="2760000" algn="ctr" rotWithShape="0">
+              <a:srgbClr val="000000">
+                <a:alpha val="43137"/>
+              </a:srgbClr>
+            </a:outerShdw>
+          </a:effectLst>
+        </p:spPr>
+      </p:pic>
     </p:spTree>
     <p:extLst>
       <p:ext uri="{BB962C8B-B14F-4D97-AF65-F5344CB8AC3E}">
-        <p14:creationId xmlns:p14="http://schemas.microsoft.com/office/powerpoint/2010/main" val="406891855"/>
+        <p14:creationId xmlns:p14="http://schemas.microsoft.com/office/powerpoint/2010/main" val="1870111510"/>
       </p:ext>
     </p:extLst>
   </p:cSld>

</xml_diff>